<commit_message>
added icon and to about box sall bugfix
</commit_message>
<xml_diff>
--- a/docs/pics/src/cmdr slides.pptx
+++ b/docs/pics/src/cmdr slides.pptx
@@ -11,6 +11,7 @@
     <p:sldId id="258" r:id="rId5"/>
     <p:sldId id="256" r:id="rId6"/>
     <p:sldId id="257" r:id="rId7"/>
+    <p:sldId id="262" r:id="rId8"/>
   </p:sldIdLst>
   <p:sldSz cx="9144000" cy="6858000" type="screen4x3"/>
   <p:notesSz cx="6858000" cy="9144000"/>
@@ -294,7 +295,7 @@
             <a:fld id="{1D8BD707-D9CF-40AE-B4C6-C98DA3205C09}" type="datetimeFigureOut">
               <a:rPr lang="en-US" smtClean="0"/>
               <a:pPr/>
-              <a:t>4/7/2020</a:t>
+              <a:t>4/22/2020</a:t>
             </a:fld>
             <a:endParaRPr lang="en-US"/>
           </a:p>
@@ -461,7 +462,7 @@
             <a:fld id="{1D8BD707-D9CF-40AE-B4C6-C98DA3205C09}" type="datetimeFigureOut">
               <a:rPr lang="en-US" smtClean="0"/>
               <a:pPr/>
-              <a:t>4/7/2020</a:t>
+              <a:t>4/22/2020</a:t>
             </a:fld>
             <a:endParaRPr lang="en-US"/>
           </a:p>
@@ -704,7 +705,7 @@
             <a:fld id="{1D8BD707-D9CF-40AE-B4C6-C98DA3205C09}" type="datetimeFigureOut">
               <a:rPr lang="en-US" smtClean="0"/>
               <a:pPr/>
-              <a:t>4/7/2020</a:t>
+              <a:t>4/22/2020</a:t>
             </a:fld>
             <a:endParaRPr lang="en-US"/>
           </a:p>
@@ -989,7 +990,7 @@
             <a:fld id="{1D8BD707-D9CF-40AE-B4C6-C98DA3205C09}" type="datetimeFigureOut">
               <a:rPr lang="en-US" smtClean="0"/>
               <a:pPr/>
-              <a:t>4/7/2020</a:t>
+              <a:t>4/22/2020</a:t>
             </a:fld>
             <a:endParaRPr lang="en-US"/>
           </a:p>
@@ -1408,7 +1409,7 @@
             <a:fld id="{1D8BD707-D9CF-40AE-B4C6-C98DA3205C09}" type="datetimeFigureOut">
               <a:rPr lang="en-US" smtClean="0"/>
               <a:pPr/>
-              <a:t>4/7/2020</a:t>
+              <a:t>4/22/2020</a:t>
             </a:fld>
             <a:endParaRPr lang="en-US"/>
           </a:p>
@@ -1523,7 +1524,7 @@
             <a:fld id="{1D8BD707-D9CF-40AE-B4C6-C98DA3205C09}" type="datetimeFigureOut">
               <a:rPr lang="en-US" smtClean="0"/>
               <a:pPr/>
-              <a:t>4/7/2020</a:t>
+              <a:t>4/22/2020</a:t>
             </a:fld>
             <a:endParaRPr lang="en-US"/>
           </a:p>
@@ -1615,7 +1616,7 @@
             <a:fld id="{1D8BD707-D9CF-40AE-B4C6-C98DA3205C09}" type="datetimeFigureOut">
               <a:rPr lang="en-US" smtClean="0"/>
               <a:pPr/>
-              <a:t>4/7/2020</a:t>
+              <a:t>4/22/2020</a:t>
             </a:fld>
             <a:endParaRPr lang="en-US"/>
           </a:p>
@@ -1840,7 +1841,7 @@
             <a:fld id="{1D8BD707-D9CF-40AE-B4C6-C98DA3205C09}" type="datetimeFigureOut">
               <a:rPr lang="en-US" smtClean="0"/>
               <a:pPr/>
-              <a:t>4/7/2020</a:t>
+              <a:t>4/22/2020</a:t>
             </a:fld>
             <a:endParaRPr lang="en-US"/>
           </a:p>
@@ -5768,6 +5769,187 @@
 </p:sld>
 </file>
 
+<file path=ppt/slides/slide7.xml><?xml version="1.0" encoding="utf-8"?>
+<p:sld xmlns:a="http://schemas.openxmlformats.org/drawingml/2006/main" xmlns:r="http://schemas.openxmlformats.org/officeDocument/2006/relationships" xmlns:p="http://schemas.openxmlformats.org/presentationml/2006/main">
+  <p:cSld>
+    <p:spTree>
+      <p:nvGrpSpPr>
+        <p:cNvPr id="1" name=""/>
+        <p:cNvGrpSpPr/>
+        <p:nvPr/>
+      </p:nvGrpSpPr>
+      <p:grpSpPr>
+        <a:xfrm>
+          <a:off x="0" y="0"/>
+          <a:ext cx="0" cy="0"/>
+          <a:chOff x="0" y="0"/>
+          <a:chExt cx="0" cy="0"/>
+        </a:xfrm>
+      </p:grpSpPr>
+      <p:sp>
+        <p:nvSpPr>
+          <p:cNvPr id="4" name="Rectangle 3"/>
+          <p:cNvSpPr/>
+          <p:nvPr/>
+        </p:nvSpPr>
+        <p:spPr>
+          <a:xfrm>
+            <a:off x="1981200" y="1295400"/>
+            <a:ext cx="3124200" cy="2514600"/>
+          </a:xfrm>
+          <a:prstGeom prst="rect">
+            <a:avLst/>
+          </a:prstGeom>
+          <a:solidFill>
+            <a:schemeClr val="bg1"/>
+          </a:solidFill>
+          <a:ln>
+            <a:noFill/>
+          </a:ln>
+        </p:spPr>
+        <p:style>
+          <a:lnRef idx="2">
+            <a:schemeClr val="accent1">
+              <a:shade val="50000"/>
+            </a:schemeClr>
+          </a:lnRef>
+          <a:fillRef idx="1">
+            <a:schemeClr val="accent1"/>
+          </a:fillRef>
+          <a:effectRef idx="0">
+            <a:schemeClr val="accent1"/>
+          </a:effectRef>
+          <a:fontRef idx="minor">
+            <a:schemeClr val="lt1"/>
+          </a:fontRef>
+        </p:style>
+        <p:txBody>
+          <a:bodyPr rtlCol="0" anchor="ctr"/>
+          <a:lstStyle/>
+          <a:p>
+            <a:pPr algn="ctr"/>
+            <a:endParaRPr lang="en-US"/>
+          </a:p>
+        </p:txBody>
+      </p:sp>
+      <p:pic>
+        <p:nvPicPr>
+          <p:cNvPr id="1026" name="Picture 2" descr="C:\Users\Pedro\Desktop\U_Root\0_linux_home\git\cmdr\docs\pics\src\icon\tsi_icon.png"/>
+          <p:cNvPicPr>
+            <a:picLocks noChangeAspect="1" noChangeArrowheads="1"/>
+          </p:cNvPicPr>
+          <p:nvPr/>
+        </p:nvPicPr>
+        <p:blipFill>
+          <a:blip r:embed="rId2">
+            <a:extLst>
+              <a:ext uri="{28A0092B-C50C-407E-A947-70E740481C1C}">
+                <a14:useLocalDpi xmlns:a14="http://schemas.microsoft.com/office/drawing/2010/main" val="0"/>
+              </a:ext>
+            </a:extLst>
+          </a:blip>
+          <a:srcRect/>
+          <a:stretch>
+            <a:fillRect/>
+          </a:stretch>
+        </p:blipFill>
+        <p:spPr bwMode="auto">
+          <a:xfrm>
+            <a:off x="2895600" y="1752600"/>
+            <a:ext cx="1171575" cy="1466850"/>
+          </a:xfrm>
+          <a:prstGeom prst="rect">
+            <a:avLst/>
+          </a:prstGeom>
+          <a:noFill/>
+          <a:extLst>
+            <a:ext uri="{909E8E84-426E-40DD-AFC4-6F175D3DCCD1}">
+              <a14:hiddenFill xmlns:a14="http://schemas.microsoft.com/office/drawing/2010/main">
+                <a:solidFill>
+                  <a:srgbClr val="FFFFFF"/>
+                </a:solidFill>
+              </a14:hiddenFill>
+            </a:ext>
+          </a:extLst>
+        </p:spPr>
+      </p:pic>
+      <p:pic>
+        <p:nvPicPr>
+          <p:cNvPr id="1027" name="Picture 3"/>
+          <p:cNvPicPr>
+            <a:picLocks noChangeAspect="1" noChangeArrowheads="1"/>
+          </p:cNvPicPr>
+          <p:nvPr/>
+        </p:nvPicPr>
+        <p:blipFill>
+          <a:blip r:embed="rId3" cstate="print">
+            <a:clrChange>
+              <a:clrFrom>
+                <a:srgbClr val="F8FAFB"/>
+              </a:clrFrom>
+              <a:clrTo>
+                <a:srgbClr val="F8FAFB">
+                  <a:alpha val="0"/>
+                </a:srgbClr>
+              </a:clrTo>
+            </a:clrChange>
+            <a:extLst>
+              <a:ext uri="{28A0092B-C50C-407E-A947-70E740481C1C}">
+                <a14:useLocalDpi xmlns:a14="http://schemas.microsoft.com/office/drawing/2010/main" val="0"/>
+              </a:ext>
+            </a:extLst>
+          </a:blip>
+          <a:srcRect/>
+          <a:stretch>
+            <a:fillRect/>
+          </a:stretch>
+        </p:blipFill>
+        <p:spPr bwMode="auto">
+          <a:xfrm>
+            <a:off x="2743200" y="1676400"/>
+            <a:ext cx="838200" cy="808686"/>
+          </a:xfrm>
+          <a:prstGeom prst="rect">
+            <a:avLst/>
+          </a:prstGeom>
+          <a:noFill/>
+          <a:ln>
+            <a:noFill/>
+          </a:ln>
+          <a:extLst>
+            <a:ext uri="{909E8E84-426E-40DD-AFC4-6F175D3DCCD1}">
+              <a14:hiddenFill xmlns:a14="http://schemas.microsoft.com/office/drawing/2010/main">
+                <a:solidFill>
+                  <a:schemeClr val="accent1"/>
+                </a:solidFill>
+              </a14:hiddenFill>
+            </a:ext>
+            <a:ext uri="{91240B29-F687-4F45-9708-019B960494DF}">
+              <a14:hiddenLine xmlns:a14="http://schemas.microsoft.com/office/drawing/2010/main" w="9525">
+                <a:solidFill>
+                  <a:schemeClr val="tx1"/>
+                </a:solidFill>
+                <a:miter lim="800000"/>
+                <a:headEnd/>
+                <a:tailEnd/>
+              </a14:hiddenLine>
+            </a:ext>
+          </a:extLst>
+        </p:spPr>
+      </p:pic>
+    </p:spTree>
+    <p:extLst>
+      <p:ext uri="{BB962C8B-B14F-4D97-AF65-F5344CB8AC3E}">
+        <p14:creationId xmlns:p14="http://schemas.microsoft.com/office/powerpoint/2010/main" val="1933597634"/>
+      </p:ext>
+    </p:extLst>
+  </p:cSld>
+  <p:clrMapOvr>
+    <a:masterClrMapping/>
+  </p:clrMapOvr>
+</p:sld>
+</file>
+
 <file path=ppt/theme/theme1.xml><?xml version="1.0" encoding="utf-8"?>
 <a:theme xmlns:a="http://schemas.openxmlformats.org/drawingml/2006/main" name="Office Theme">
   <a:themeElements>

</xml_diff>

<commit_message>
added new documentation pictures
</commit_message>
<xml_diff>
--- a/docs/pics/src/cmdr slides.pptx
+++ b/docs/pics/src/cmdr slides.pptx
@@ -7,11 +7,11 @@
   <p:sldIdLst>
     <p:sldId id="259" r:id="rId2"/>
     <p:sldId id="261" r:id="rId3"/>
-    <p:sldId id="260" r:id="rId4"/>
-    <p:sldId id="258" r:id="rId5"/>
-    <p:sldId id="256" r:id="rId6"/>
-    <p:sldId id="257" r:id="rId7"/>
-    <p:sldId id="262" r:id="rId8"/>
+    <p:sldId id="263" r:id="rId4"/>
+    <p:sldId id="260" r:id="rId5"/>
+    <p:sldId id="265" r:id="rId6"/>
+    <p:sldId id="262" r:id="rId7"/>
+    <p:sldId id="258" r:id="rId8"/>
   </p:sldIdLst>
   <p:sldSz cx="9144000" cy="6858000" type="screen4x3"/>
   <p:notesSz cx="6858000" cy="9144000"/>
@@ -295,7 +295,7 @@
             <a:fld id="{1D8BD707-D9CF-40AE-B4C6-C98DA3205C09}" type="datetimeFigureOut">
               <a:rPr lang="en-US" smtClean="0"/>
               <a:pPr/>
-              <a:t>4/22/2020</a:t>
+              <a:t>4/24/2020</a:t>
             </a:fld>
             <a:endParaRPr lang="en-US"/>
           </a:p>
@@ -462,7 +462,7 @@
             <a:fld id="{1D8BD707-D9CF-40AE-B4C6-C98DA3205C09}" type="datetimeFigureOut">
               <a:rPr lang="en-US" smtClean="0"/>
               <a:pPr/>
-              <a:t>4/22/2020</a:t>
+              <a:t>4/24/2020</a:t>
             </a:fld>
             <a:endParaRPr lang="en-US"/>
           </a:p>
@@ -705,7 +705,7 @@
             <a:fld id="{1D8BD707-D9CF-40AE-B4C6-C98DA3205C09}" type="datetimeFigureOut">
               <a:rPr lang="en-US" smtClean="0"/>
               <a:pPr/>
-              <a:t>4/22/2020</a:t>
+              <a:t>4/24/2020</a:t>
             </a:fld>
             <a:endParaRPr lang="en-US"/>
           </a:p>
@@ -990,7 +990,7 @@
             <a:fld id="{1D8BD707-D9CF-40AE-B4C6-C98DA3205C09}" type="datetimeFigureOut">
               <a:rPr lang="en-US" smtClean="0"/>
               <a:pPr/>
-              <a:t>4/22/2020</a:t>
+              <a:t>4/24/2020</a:t>
             </a:fld>
             <a:endParaRPr lang="en-US"/>
           </a:p>
@@ -1409,7 +1409,7 @@
             <a:fld id="{1D8BD707-D9CF-40AE-B4C6-C98DA3205C09}" type="datetimeFigureOut">
               <a:rPr lang="en-US" smtClean="0"/>
               <a:pPr/>
-              <a:t>4/22/2020</a:t>
+              <a:t>4/24/2020</a:t>
             </a:fld>
             <a:endParaRPr lang="en-US"/>
           </a:p>
@@ -1524,7 +1524,7 @@
             <a:fld id="{1D8BD707-D9CF-40AE-B4C6-C98DA3205C09}" type="datetimeFigureOut">
               <a:rPr lang="en-US" smtClean="0"/>
               <a:pPr/>
-              <a:t>4/22/2020</a:t>
+              <a:t>4/24/2020</a:t>
             </a:fld>
             <a:endParaRPr lang="en-US"/>
           </a:p>
@@ -1616,7 +1616,7 @@
             <a:fld id="{1D8BD707-D9CF-40AE-B4C6-C98DA3205C09}" type="datetimeFigureOut">
               <a:rPr lang="en-US" smtClean="0"/>
               <a:pPr/>
-              <a:t>4/22/2020</a:t>
+              <a:t>4/24/2020</a:t>
             </a:fld>
             <a:endParaRPr lang="en-US"/>
           </a:p>
@@ -1841,7 +1841,7 @@
             <a:fld id="{1D8BD707-D9CF-40AE-B4C6-C98DA3205C09}" type="datetimeFigureOut">
               <a:rPr lang="en-US" smtClean="0"/>
               <a:pPr/>
-              <a:t>4/22/2020</a:t>
+              <a:t>4/24/2020</a:t>
             </a:fld>
             <a:endParaRPr lang="en-US"/>
           </a:p>
@@ -2850,8 +2850,8 @@
         </p:nvSpPr>
         <p:spPr>
           <a:xfrm>
-            <a:off x="838200" y="759570"/>
-            <a:ext cx="2156616" cy="369332"/>
+            <a:off x="838200" y="685800"/>
+            <a:ext cx="2952731" cy="369332"/>
           </a:xfrm>
           <a:prstGeom prst="rect">
             <a:avLst/>
@@ -2866,7 +2866,7 @@
           <a:p>
             <a:r>
               <a:rPr lang="en-US" b="1" dirty="0" smtClean="0"/>
-              <a:t>2020 improvements:</a:t>
+              <a:t>January 2020 improvements:</a:t>
             </a:r>
             <a:endParaRPr lang="en-US" b="1" dirty="0"/>
           </a:p>
@@ -2904,7 +2904,7 @@
       </p:grpSpPr>
       <p:pic>
         <p:nvPicPr>
-          <p:cNvPr id="3074" name="Picture 2"/>
+          <p:cNvPr id="2050" name="Picture 2"/>
           <p:cNvPicPr>
             <a:picLocks noChangeAspect="1" noChangeArrowheads="1"/>
           </p:cNvPicPr>
@@ -2925,8 +2925,8 @@
         </p:blipFill>
         <p:spPr bwMode="auto">
           <a:xfrm>
-            <a:off x="2514600" y="1295400"/>
-            <a:ext cx="4271963" cy="3400281"/>
+            <a:off x="141061" y="1652321"/>
+            <a:ext cx="7066189" cy="3727058"/>
           </a:xfrm>
           <a:prstGeom prst="rect">
             <a:avLst/>
@@ -2958,21 +2958,21 @@
       </p:pic>
       <p:sp>
         <p:nvSpPr>
-          <p:cNvPr id="5" name="Line Callout 1 (Accent Bar) 4"/>
+          <p:cNvPr id="4" name="Line Callout 1 (Accent Bar) 3"/>
           <p:cNvSpPr/>
           <p:nvPr/>
         </p:nvSpPr>
         <p:spPr>
           <a:xfrm>
-            <a:off x="6934200" y="3096006"/>
-            <a:ext cx="1219200" cy="180594"/>
+            <a:off x="2819400" y="5557647"/>
+            <a:ext cx="1219200" cy="408392"/>
           </a:xfrm>
           <a:prstGeom prst="accentCallout1">
             <a:avLst>
               <a:gd name="adj1" fmla="val 45417"/>
               <a:gd name="adj2" fmla="val -2669"/>
-              <a:gd name="adj3" fmla="val 145454"/>
-              <a:gd name="adj4" fmla="val -95713"/>
+              <a:gd name="adj3" fmla="val -525444"/>
+              <a:gd name="adj4" fmla="val -34031"/>
             </a:avLst>
           </a:prstGeom>
           <a:noFill/>
@@ -3008,7 +3008,22 @@
                   <a:schemeClr val="tx1"/>
                 </a:solidFill>
               </a:rPr>
-              <a:t>Reduce FX list</a:t>
+              <a:t>Yellow Filters</a:t>
+            </a:r>
+            <a:br>
+              <a:rPr lang="en-US" sz="1200" dirty="0" smtClean="0">
+                <a:solidFill>
+                  <a:schemeClr val="tx1"/>
+                </a:solidFill>
+              </a:rPr>
+            </a:br>
+            <a:r>
+              <a:rPr lang="en-US" sz="1200" dirty="0" smtClean="0">
+                <a:solidFill>
+                  <a:schemeClr val="tx1"/>
+                </a:solidFill>
+              </a:rPr>
+              <a:t>Clear filters when changing pages </a:t>
             </a:r>
             <a:endParaRPr lang="en-US" sz="1200" dirty="0">
               <a:solidFill>
@@ -3020,21 +3035,21 @@
       </p:sp>
       <p:sp>
         <p:nvSpPr>
-          <p:cNvPr id="6" name="Line Callout 1 (Accent Bar) 5"/>
+          <p:cNvPr id="5" name="Line Callout 1 (Accent Bar) 4"/>
           <p:cNvSpPr/>
           <p:nvPr/>
         </p:nvSpPr>
         <p:spPr>
           <a:xfrm>
-            <a:off x="6934200" y="3411855"/>
-            <a:ext cx="1219200" cy="180594"/>
+            <a:off x="6013449" y="5719953"/>
+            <a:ext cx="1449955" cy="180594"/>
           </a:xfrm>
           <a:prstGeom prst="accentCallout1">
             <a:avLst>
               <a:gd name="adj1" fmla="val 45417"/>
               <a:gd name="adj2" fmla="val -2669"/>
-              <a:gd name="adj3" fmla="val 145454"/>
-              <a:gd name="adj4" fmla="val -95713"/>
+              <a:gd name="adj3" fmla="val -395535"/>
+              <a:gd name="adj4" fmla="val -17318"/>
             </a:avLst>
           </a:prstGeom>
           <a:noFill/>
@@ -3070,7 +3085,7 @@
                   <a:schemeClr val="tx1"/>
                 </a:solidFill>
               </a:rPr>
-              <a:t>Remove TSI entries</a:t>
+              <a:t>Shows filtered count</a:t>
             </a:r>
             <a:endParaRPr lang="en-US" sz="1200" dirty="0">
               <a:solidFill>
@@ -3082,14 +3097,257 @@
       </p:sp>
       <p:sp>
         <p:nvSpPr>
-          <p:cNvPr id="2" name="TextBox 1"/>
+          <p:cNvPr id="7" name="Line Callout 1 (Accent Bar) 6"/>
+          <p:cNvSpPr/>
+          <p:nvPr/>
+        </p:nvSpPr>
+        <p:spPr>
+          <a:xfrm>
+            <a:off x="1930400" y="1160517"/>
+            <a:ext cx="1676400" cy="270891"/>
+          </a:xfrm>
+          <a:prstGeom prst="accentCallout1">
+            <a:avLst>
+              <a:gd name="adj1" fmla="val 45417"/>
+              <a:gd name="adj2" fmla="val -2669"/>
+              <a:gd name="adj3" fmla="val 329132"/>
+              <a:gd name="adj4" fmla="val -24468"/>
+            </a:avLst>
+          </a:prstGeom>
+          <a:noFill/>
+          <a:ln>
+            <a:solidFill>
+              <a:schemeClr val="accent2"/>
+            </a:solidFill>
+          </a:ln>
+        </p:spPr>
+        <p:style>
+          <a:lnRef idx="2">
+            <a:schemeClr val="accent1">
+              <a:shade val="50000"/>
+            </a:schemeClr>
+          </a:lnRef>
+          <a:fillRef idx="1">
+            <a:schemeClr val="accent1"/>
+          </a:fillRef>
+          <a:effectRef idx="0">
+            <a:schemeClr val="accent1"/>
+          </a:effectRef>
+          <a:fontRef idx="minor">
+            <a:schemeClr val="lt1"/>
+          </a:fontRef>
+        </p:style>
+        <p:txBody>
+          <a:bodyPr lIns="0" tIns="0" rIns="0" bIns="0" rtlCol="0" anchor="ctr"/>
+          <a:lstStyle/>
+          <a:p>
+            <a:r>
+              <a:rPr lang="en-US" sz="1200" dirty="0" smtClean="0">
+                <a:solidFill>
+                  <a:schemeClr val="tx1"/>
+                </a:solidFill>
+              </a:rPr>
+              <a:t>Save CSV</a:t>
+            </a:r>
+          </a:p>
+          <a:p>
+            <a:r>
+              <a:rPr lang="en-US" sz="1200" dirty="0" smtClean="0">
+                <a:solidFill>
+                  <a:schemeClr val="tx1"/>
+                </a:solidFill>
+              </a:rPr>
+              <a:t>2x Reports</a:t>
+            </a:r>
+            <a:endParaRPr lang="en-US" sz="1200" dirty="0">
+              <a:solidFill>
+                <a:schemeClr val="tx1"/>
+              </a:solidFill>
+            </a:endParaRPr>
+          </a:p>
+        </p:txBody>
+      </p:sp>
+      <p:sp>
+        <p:nvSpPr>
+          <p:cNvPr id="8" name="Line Callout 1 (Accent Bar) 7"/>
+          <p:cNvSpPr/>
+          <p:nvPr/>
+        </p:nvSpPr>
+        <p:spPr>
+          <a:xfrm>
+            <a:off x="4114800" y="1161214"/>
+            <a:ext cx="2117092" cy="422312"/>
+          </a:xfrm>
+          <a:prstGeom prst="accentCallout1">
+            <a:avLst>
+              <a:gd name="adj1" fmla="val 45417"/>
+              <a:gd name="adj2" fmla="val -2669"/>
+              <a:gd name="adj3" fmla="val 659764"/>
+              <a:gd name="adj4" fmla="val -25278"/>
+            </a:avLst>
+          </a:prstGeom>
+          <a:noFill/>
+          <a:ln>
+            <a:solidFill>
+              <a:schemeClr val="accent2"/>
+            </a:solidFill>
+          </a:ln>
+        </p:spPr>
+        <p:style>
+          <a:lnRef idx="2">
+            <a:schemeClr val="accent1">
+              <a:shade val="50000"/>
+            </a:schemeClr>
+          </a:lnRef>
+          <a:fillRef idx="1">
+            <a:schemeClr val="accent1"/>
+          </a:fillRef>
+          <a:effectRef idx="0">
+            <a:schemeClr val="accent1"/>
+          </a:effectRef>
+          <a:fontRef idx="minor">
+            <a:schemeClr val="lt1"/>
+          </a:fontRef>
+        </p:style>
+        <p:txBody>
+          <a:bodyPr lIns="0" tIns="0" rIns="0" bIns="0" rtlCol="0" anchor="ctr"/>
+          <a:lstStyle/>
+          <a:p>
+            <a:r>
+              <a:rPr lang="en-US" sz="1200" b="1" dirty="0" smtClean="0">
+                <a:solidFill>
+                  <a:schemeClr val="tx1"/>
+                </a:solidFill>
+              </a:rPr>
+              <a:t>32 commands </a:t>
+            </a:r>
+            <a:r>
+              <a:rPr lang="en-US" sz="1200" b="1" dirty="0">
+                <a:solidFill>
+                  <a:schemeClr val="tx1"/>
+                </a:solidFill>
+              </a:rPr>
+              <a:t>Auto Generated </a:t>
+            </a:r>
+            <a:r>
+              <a:rPr lang="en-US" sz="1200" b="1" dirty="0" smtClean="0">
+                <a:solidFill>
+                  <a:schemeClr val="tx1"/>
+                </a:solidFill>
+              </a:rPr>
+              <a:t>!!</a:t>
+            </a:r>
+            <a:br>
+              <a:rPr lang="en-US" sz="1200" b="1" dirty="0" smtClean="0">
+                <a:solidFill>
+                  <a:schemeClr val="tx1"/>
+                </a:solidFill>
+              </a:rPr>
+            </a:br>
+            <a:r>
+              <a:rPr lang="en-US" sz="1200" b="1" dirty="0" smtClean="0">
+                <a:solidFill>
+                  <a:schemeClr val="tx1"/>
+                </a:solidFill>
+              </a:rPr>
+              <a:t>(4 </a:t>
+            </a:r>
+            <a:r>
+              <a:rPr lang="en-US" sz="1200" b="1" dirty="0" err="1" smtClean="0">
+                <a:solidFill>
+                  <a:schemeClr val="tx1"/>
+                </a:solidFill>
+              </a:rPr>
+              <a:t>channels+decks</a:t>
+            </a:r>
+            <a:r>
+              <a:rPr lang="en-US" sz="1200" b="1" dirty="0" smtClean="0">
+                <a:solidFill>
+                  <a:schemeClr val="tx1"/>
+                </a:solidFill>
+              </a:rPr>
+              <a:t> x 8 Pads)</a:t>
+            </a:r>
+            <a:endParaRPr lang="en-US" sz="1200" b="1" dirty="0">
+              <a:solidFill>
+                <a:schemeClr val="tx1"/>
+              </a:solidFill>
+            </a:endParaRPr>
+          </a:p>
+        </p:txBody>
+      </p:sp>
+      <p:sp>
+        <p:nvSpPr>
+          <p:cNvPr id="10" name="Line Callout 1 (Accent Bar) 9"/>
+          <p:cNvSpPr/>
+          <p:nvPr/>
+        </p:nvSpPr>
+        <p:spPr>
+          <a:xfrm>
+            <a:off x="762000" y="5700903"/>
+            <a:ext cx="1219200" cy="180594"/>
+          </a:xfrm>
+          <a:prstGeom prst="accentCallout1">
+            <a:avLst>
+              <a:gd name="adj1" fmla="val 45417"/>
+              <a:gd name="adj2" fmla="val -2669"/>
+              <a:gd name="adj3" fmla="val -435629"/>
+              <a:gd name="adj4" fmla="val -21370"/>
+            </a:avLst>
+          </a:prstGeom>
+          <a:noFill/>
+          <a:ln>
+            <a:solidFill>
+              <a:schemeClr val="accent2"/>
+            </a:solidFill>
+          </a:ln>
+        </p:spPr>
+        <p:style>
+          <a:lnRef idx="2">
+            <a:schemeClr val="accent1">
+              <a:shade val="50000"/>
+            </a:schemeClr>
+          </a:lnRef>
+          <a:fillRef idx="1">
+            <a:schemeClr val="accent1"/>
+          </a:fillRef>
+          <a:effectRef idx="0">
+            <a:schemeClr val="accent1"/>
+          </a:effectRef>
+          <a:fontRef idx="minor">
+            <a:schemeClr val="lt1"/>
+          </a:fontRef>
+        </p:style>
+        <p:txBody>
+          <a:bodyPr lIns="0" tIns="0" rIns="0" bIns="0" rtlCol="0" anchor="ctr"/>
+          <a:lstStyle/>
+          <a:p>
+            <a:r>
+              <a:rPr lang="en-US" sz="1200" dirty="0" smtClean="0">
+                <a:solidFill>
+                  <a:schemeClr val="tx1"/>
+                </a:solidFill>
+              </a:rPr>
+              <a:t>Search commands</a:t>
+            </a:r>
+            <a:endParaRPr lang="en-US" sz="1200" dirty="0">
+              <a:solidFill>
+                <a:schemeClr val="tx1"/>
+              </a:solidFill>
+            </a:endParaRPr>
+          </a:p>
+        </p:txBody>
+      </p:sp>
+      <p:sp>
+        <p:nvSpPr>
+          <p:cNvPr id="11" name="TextBox 10"/>
           <p:cNvSpPr txBox="1"/>
           <p:nvPr/>
         </p:nvSpPr>
         <p:spPr>
           <a:xfrm>
-            <a:off x="2209800" y="838200"/>
-            <a:ext cx="1170129" cy="369332"/>
+            <a:off x="76200" y="574904"/>
+            <a:ext cx="2666371" cy="369332"/>
           </a:xfrm>
           <a:prstGeom prst="rect">
             <a:avLst/>
@@ -3104,7 +3362,711 @@
           <a:p>
             <a:r>
               <a:rPr lang="en-US" b="1" dirty="0" smtClean="0"/>
-              <a:t>SETTINGS:</a:t>
+              <a:t>April 2020 improvements:</a:t>
+            </a:r>
+            <a:endParaRPr lang="en-US" b="1" dirty="0"/>
+          </a:p>
+        </p:txBody>
+      </p:sp>
+      <p:pic>
+        <p:nvPicPr>
+          <p:cNvPr id="2052" name="Picture 4"/>
+          <p:cNvPicPr>
+            <a:picLocks noChangeAspect="1" noChangeArrowheads="1"/>
+          </p:cNvPicPr>
+          <p:nvPr/>
+        </p:nvPicPr>
+        <p:blipFill rotWithShape="1">
+          <a:blip r:embed="rId3">
+            <a:extLst>
+              <a:ext uri="{28A0092B-C50C-407E-A947-70E740481C1C}">
+                <a14:useLocalDpi xmlns:a14="http://schemas.microsoft.com/office/drawing/2010/main" val="0"/>
+              </a:ext>
+            </a:extLst>
+          </a:blip>
+          <a:srcRect b="41788"/>
+          <a:stretch/>
+        </p:blipFill>
+        <p:spPr bwMode="auto">
+          <a:xfrm>
+            <a:off x="7086600" y="3428999"/>
+            <a:ext cx="533400" cy="1412937"/>
+          </a:xfrm>
+          <a:prstGeom prst="rect">
+            <a:avLst/>
+          </a:prstGeom>
+          <a:noFill/>
+          <a:ln>
+            <a:noFill/>
+          </a:ln>
+          <a:extLst>
+            <a:ext uri="{909E8E84-426E-40DD-AFC4-6F175D3DCCD1}">
+              <a14:hiddenFill xmlns:a14="http://schemas.microsoft.com/office/drawing/2010/main">
+                <a:solidFill>
+                  <a:schemeClr val="accent1"/>
+                </a:solidFill>
+              </a14:hiddenFill>
+            </a:ext>
+            <a:ext uri="{91240B29-F687-4F45-9708-019B960494DF}">
+              <a14:hiddenLine xmlns:a14="http://schemas.microsoft.com/office/drawing/2010/main" w="9525">
+                <a:solidFill>
+                  <a:schemeClr val="tx1"/>
+                </a:solidFill>
+                <a:miter lim="800000"/>
+                <a:headEnd/>
+                <a:tailEnd/>
+              </a14:hiddenLine>
+            </a:ext>
+          </a:extLst>
+        </p:spPr>
+      </p:pic>
+      <p:grpSp>
+        <p:nvGrpSpPr>
+          <p:cNvPr id="2" name="Group 1"/>
+          <p:cNvGrpSpPr/>
+          <p:nvPr/>
+        </p:nvGrpSpPr>
+        <p:grpSpPr>
+          <a:xfrm>
+            <a:off x="7045996" y="2209712"/>
+            <a:ext cx="1261213" cy="836036"/>
+            <a:chOff x="4057650" y="2381249"/>
+            <a:chExt cx="2705100" cy="1793164"/>
+          </a:xfrm>
+        </p:grpSpPr>
+        <p:pic>
+          <p:nvPicPr>
+            <p:cNvPr id="2053" name="Picture 5"/>
+            <p:cNvPicPr>
+              <a:picLocks noChangeAspect="1" noChangeArrowheads="1"/>
+            </p:cNvPicPr>
+            <p:nvPr/>
+          </p:nvPicPr>
+          <p:blipFill rotWithShape="1">
+            <a:blip r:embed="rId4">
+              <a:extLst>
+                <a:ext uri="{28A0092B-C50C-407E-A947-70E740481C1C}">
+                  <a14:useLocalDpi xmlns:a14="http://schemas.microsoft.com/office/drawing/2010/main" val="0"/>
+                </a:ext>
+              </a:extLst>
+            </a:blip>
+            <a:srcRect b="14428"/>
+            <a:stretch/>
+          </p:blipFill>
+          <p:spPr bwMode="auto">
+            <a:xfrm>
+              <a:off x="4057650" y="2381251"/>
+              <a:ext cx="1028700" cy="1793162"/>
+            </a:xfrm>
+            <a:prstGeom prst="rect">
+              <a:avLst/>
+            </a:prstGeom>
+            <a:noFill/>
+            <a:ln>
+              <a:noFill/>
+            </a:ln>
+            <a:extLst>
+              <a:ext uri="{909E8E84-426E-40DD-AFC4-6F175D3DCCD1}">
+                <a14:hiddenFill xmlns:a14="http://schemas.microsoft.com/office/drawing/2010/main">
+                  <a:solidFill>
+                    <a:schemeClr val="accent1"/>
+                  </a:solidFill>
+                </a14:hiddenFill>
+              </a:ext>
+              <a:ext uri="{91240B29-F687-4F45-9708-019B960494DF}">
+                <a14:hiddenLine xmlns:a14="http://schemas.microsoft.com/office/drawing/2010/main" w="9525">
+                  <a:solidFill>
+                    <a:schemeClr val="tx1"/>
+                  </a:solidFill>
+                  <a:miter lim="800000"/>
+                  <a:headEnd/>
+                  <a:tailEnd/>
+                </a14:hiddenLine>
+              </a:ext>
+            </a:extLst>
+          </p:spPr>
+        </p:pic>
+        <p:pic>
+          <p:nvPicPr>
+            <p:cNvPr id="2054" name="Picture 6"/>
+            <p:cNvPicPr>
+              <a:picLocks noChangeAspect="1" noChangeArrowheads="1"/>
+            </p:cNvPicPr>
+            <p:nvPr/>
+          </p:nvPicPr>
+          <p:blipFill>
+            <a:blip r:embed="rId5">
+              <a:extLst>
+                <a:ext uri="{28A0092B-C50C-407E-A947-70E740481C1C}">
+                  <a14:useLocalDpi xmlns:a14="http://schemas.microsoft.com/office/drawing/2010/main" val="0"/>
+                </a:ext>
+              </a:extLst>
+            </a:blip>
+            <a:srcRect/>
+            <a:stretch>
+              <a:fillRect/>
+            </a:stretch>
+          </p:blipFill>
+          <p:spPr bwMode="auto">
+            <a:xfrm>
+              <a:off x="5086350" y="2381249"/>
+              <a:ext cx="1676400" cy="1038225"/>
+            </a:xfrm>
+            <a:prstGeom prst="rect">
+              <a:avLst/>
+            </a:prstGeom>
+            <a:noFill/>
+            <a:ln>
+              <a:noFill/>
+            </a:ln>
+            <a:extLst>
+              <a:ext uri="{909E8E84-426E-40DD-AFC4-6F175D3DCCD1}">
+                <a14:hiddenFill xmlns:a14="http://schemas.microsoft.com/office/drawing/2010/main">
+                  <a:solidFill>
+                    <a:schemeClr val="accent1"/>
+                  </a:solidFill>
+                </a14:hiddenFill>
+              </a:ext>
+              <a:ext uri="{91240B29-F687-4F45-9708-019B960494DF}">
+                <a14:hiddenLine xmlns:a14="http://schemas.microsoft.com/office/drawing/2010/main" w="9525">
+                  <a:solidFill>
+                    <a:schemeClr val="tx1"/>
+                  </a:solidFill>
+                  <a:miter lim="800000"/>
+                  <a:headEnd/>
+                  <a:tailEnd/>
+                </a14:hiddenLine>
+              </a:ext>
+            </a:extLst>
+          </p:spPr>
+        </p:pic>
+      </p:grpSp>
+      <p:sp>
+        <p:nvSpPr>
+          <p:cNvPr id="16" name="Line Callout 1 (Accent Bar) 15"/>
+          <p:cNvSpPr/>
+          <p:nvPr/>
+        </p:nvSpPr>
+        <p:spPr>
+          <a:xfrm>
+            <a:off x="1447800" y="5486400"/>
+            <a:ext cx="1219200" cy="180594"/>
+          </a:xfrm>
+          <a:prstGeom prst="accentCallout1">
+            <a:avLst>
+              <a:gd name="adj1" fmla="val 45417"/>
+              <a:gd name="adj2" fmla="val -2669"/>
+              <a:gd name="adj3" fmla="val -185981"/>
+              <a:gd name="adj4" fmla="val -25537"/>
+            </a:avLst>
+          </a:prstGeom>
+          <a:noFill/>
+          <a:ln>
+            <a:solidFill>
+              <a:schemeClr val="accent2"/>
+            </a:solidFill>
+          </a:ln>
+        </p:spPr>
+        <p:style>
+          <a:lnRef idx="2">
+            <a:schemeClr val="accent1">
+              <a:shade val="50000"/>
+            </a:schemeClr>
+          </a:lnRef>
+          <a:fillRef idx="1">
+            <a:schemeClr val="accent1"/>
+          </a:fillRef>
+          <a:effectRef idx="0">
+            <a:schemeClr val="accent1"/>
+          </a:effectRef>
+          <a:fontRef idx="minor">
+            <a:schemeClr val="lt1"/>
+          </a:fontRef>
+        </p:style>
+        <p:txBody>
+          <a:bodyPr lIns="0" tIns="0" rIns="0" bIns="0" rtlCol="0" anchor="ctr"/>
+          <a:lstStyle/>
+          <a:p>
+            <a:r>
+              <a:rPr lang="en-US" sz="1200" dirty="0" smtClean="0">
+                <a:solidFill>
+                  <a:schemeClr val="tx1"/>
+                </a:solidFill>
+              </a:rPr>
+              <a:t>Search commands</a:t>
+            </a:r>
+            <a:endParaRPr lang="en-US" sz="1200" dirty="0">
+              <a:solidFill>
+                <a:schemeClr val="tx1"/>
+              </a:solidFill>
+            </a:endParaRPr>
+          </a:p>
+        </p:txBody>
+      </p:sp>
+      <p:sp>
+        <p:nvSpPr>
+          <p:cNvPr id="6" name="Line Callout 1 (Accent Bar) 5"/>
+          <p:cNvSpPr/>
+          <p:nvPr/>
+        </p:nvSpPr>
+        <p:spPr>
+          <a:xfrm>
+            <a:off x="7306810" y="1295962"/>
+            <a:ext cx="1532390" cy="287564"/>
+          </a:xfrm>
+          <a:prstGeom prst="accentCallout1">
+            <a:avLst>
+              <a:gd name="adj1" fmla="val 45417"/>
+              <a:gd name="adj2" fmla="val -2669"/>
+              <a:gd name="adj3" fmla="val 506003"/>
+              <a:gd name="adj4" fmla="val -13998"/>
+            </a:avLst>
+          </a:prstGeom>
+          <a:noFill/>
+          <a:ln>
+            <a:solidFill>
+              <a:schemeClr val="accent2"/>
+            </a:solidFill>
+          </a:ln>
+        </p:spPr>
+        <p:style>
+          <a:lnRef idx="2">
+            <a:schemeClr val="accent1">
+              <a:shade val="50000"/>
+            </a:schemeClr>
+          </a:lnRef>
+          <a:fillRef idx="1">
+            <a:schemeClr val="accent1"/>
+          </a:fillRef>
+          <a:effectRef idx="0">
+            <a:schemeClr val="accent1"/>
+          </a:effectRef>
+          <a:fontRef idx="minor">
+            <a:schemeClr val="lt1"/>
+          </a:fontRef>
+        </p:style>
+        <p:txBody>
+          <a:bodyPr lIns="0" tIns="0" rIns="0" bIns="0" rtlCol="0" anchor="ctr"/>
+          <a:lstStyle/>
+          <a:p>
+            <a:r>
+              <a:rPr lang="en-US" sz="1200" dirty="0" smtClean="0">
+                <a:solidFill>
+                  <a:schemeClr val="tx1"/>
+                </a:solidFill>
+              </a:rPr>
+              <a:t>Common conditions</a:t>
+            </a:r>
+            <a:br>
+              <a:rPr lang="en-US" sz="1200" dirty="0" smtClean="0">
+                <a:solidFill>
+                  <a:schemeClr val="tx1"/>
+                </a:solidFill>
+              </a:rPr>
+            </a:br>
+            <a:r>
+              <a:rPr lang="en-US" sz="1200" dirty="0" smtClean="0">
+                <a:solidFill>
+                  <a:schemeClr val="tx1"/>
+                </a:solidFill>
+              </a:rPr>
+              <a:t>without tree</a:t>
+            </a:r>
+            <a:endParaRPr lang="en-US" sz="1200" dirty="0">
+              <a:solidFill>
+                <a:schemeClr val="tx1"/>
+              </a:solidFill>
+            </a:endParaRPr>
+          </a:p>
+        </p:txBody>
+      </p:sp>
+      <p:sp>
+        <p:nvSpPr>
+          <p:cNvPr id="9" name="Line Callout 1 (Accent Bar) 8"/>
+          <p:cNvSpPr/>
+          <p:nvPr/>
+        </p:nvSpPr>
+        <p:spPr>
+          <a:xfrm>
+            <a:off x="7390630" y="5105400"/>
+            <a:ext cx="1219200" cy="180594"/>
+          </a:xfrm>
+          <a:prstGeom prst="accentCallout1">
+            <a:avLst>
+              <a:gd name="adj1" fmla="val 45417"/>
+              <a:gd name="adj2" fmla="val -2669"/>
+              <a:gd name="adj3" fmla="val -338758"/>
+              <a:gd name="adj4" fmla="val -15813"/>
+            </a:avLst>
+          </a:prstGeom>
+          <a:noFill/>
+          <a:ln>
+            <a:solidFill>
+              <a:schemeClr val="accent2"/>
+            </a:solidFill>
+          </a:ln>
+        </p:spPr>
+        <p:style>
+          <a:lnRef idx="2">
+            <a:schemeClr val="accent1">
+              <a:shade val="50000"/>
+            </a:schemeClr>
+          </a:lnRef>
+          <a:fillRef idx="1">
+            <a:schemeClr val="accent1"/>
+          </a:fillRef>
+          <a:effectRef idx="0">
+            <a:schemeClr val="accent1"/>
+          </a:effectRef>
+          <a:fontRef idx="minor">
+            <a:schemeClr val="lt1"/>
+          </a:fontRef>
+        </p:style>
+        <p:txBody>
+          <a:bodyPr lIns="0" tIns="0" rIns="0" bIns="0" rtlCol="0" anchor="ctr"/>
+          <a:lstStyle/>
+          <a:p>
+            <a:r>
+              <a:rPr lang="en-US" sz="1200" dirty="0" smtClean="0">
+                <a:solidFill>
+                  <a:schemeClr val="tx1"/>
+                </a:solidFill>
+              </a:rPr>
+              <a:t>No sub-sub-trees anymore</a:t>
+            </a:r>
+            <a:endParaRPr lang="en-US" sz="1200" dirty="0">
+              <a:solidFill>
+                <a:schemeClr val="tx1"/>
+              </a:solidFill>
+            </a:endParaRPr>
+          </a:p>
+        </p:txBody>
+      </p:sp>
+      <p:sp>
+        <p:nvSpPr>
+          <p:cNvPr id="17" name="Line Callout 1 (Accent Bar) 16"/>
+          <p:cNvSpPr/>
+          <p:nvPr/>
+        </p:nvSpPr>
+        <p:spPr>
+          <a:xfrm>
+            <a:off x="7697609" y="3203430"/>
+            <a:ext cx="1219200" cy="304799"/>
+          </a:xfrm>
+          <a:prstGeom prst="accentCallout1">
+            <a:avLst>
+              <a:gd name="adj1" fmla="val 45417"/>
+              <a:gd name="adj2" fmla="val -2669"/>
+              <a:gd name="adj3" fmla="val 105044"/>
+              <a:gd name="adj4" fmla="val -24563"/>
+            </a:avLst>
+          </a:prstGeom>
+          <a:noFill/>
+          <a:ln>
+            <a:solidFill>
+              <a:schemeClr val="accent2"/>
+            </a:solidFill>
+          </a:ln>
+        </p:spPr>
+        <p:style>
+          <a:lnRef idx="2">
+            <a:schemeClr val="accent1">
+              <a:shade val="50000"/>
+            </a:schemeClr>
+          </a:lnRef>
+          <a:fillRef idx="1">
+            <a:schemeClr val="accent1"/>
+          </a:fillRef>
+          <a:effectRef idx="0">
+            <a:schemeClr val="accent1"/>
+          </a:effectRef>
+          <a:fontRef idx="minor">
+            <a:schemeClr val="lt1"/>
+          </a:fontRef>
+        </p:style>
+        <p:txBody>
+          <a:bodyPr lIns="0" tIns="0" rIns="0" bIns="0" rtlCol="0" anchor="ctr"/>
+          <a:lstStyle/>
+          <a:p>
+            <a:r>
+              <a:rPr lang="en-US" sz="1200" dirty="0" smtClean="0">
+                <a:solidFill>
+                  <a:schemeClr val="tx1"/>
+                </a:solidFill>
+              </a:rPr>
+              <a:t>Shortcuts to </a:t>
+            </a:r>
+            <a:r>
+              <a:rPr lang="en-US" sz="1200" dirty="0" err="1" smtClean="0">
+                <a:solidFill>
+                  <a:schemeClr val="tx1"/>
+                </a:solidFill>
+              </a:rPr>
+              <a:t>channel+note</a:t>
+            </a:r>
+            <a:endParaRPr lang="en-US" sz="1200" dirty="0">
+              <a:solidFill>
+                <a:schemeClr val="tx1"/>
+              </a:solidFill>
+            </a:endParaRPr>
+          </a:p>
+        </p:txBody>
+      </p:sp>
+    </p:spTree>
+    <p:extLst>
+      <p:ext uri="{BB962C8B-B14F-4D97-AF65-F5344CB8AC3E}">
+        <p14:creationId xmlns:p14="http://schemas.microsoft.com/office/powerpoint/2010/main" val="2686691035"/>
+      </p:ext>
+    </p:extLst>
+  </p:cSld>
+  <p:clrMapOvr>
+    <a:masterClrMapping/>
+  </p:clrMapOvr>
+</p:sld>
+</file>
+
+<file path=ppt/slides/slide4.xml><?xml version="1.0" encoding="utf-8"?>
+<p:sld xmlns:a="http://schemas.openxmlformats.org/drawingml/2006/main" xmlns:r="http://schemas.openxmlformats.org/officeDocument/2006/relationships" xmlns:p="http://schemas.openxmlformats.org/presentationml/2006/main">
+  <p:cSld>
+    <p:spTree>
+      <p:nvGrpSpPr>
+        <p:cNvPr id="1" name=""/>
+        <p:cNvGrpSpPr/>
+        <p:nvPr/>
+      </p:nvGrpSpPr>
+      <p:grpSpPr>
+        <a:xfrm>
+          <a:off x="0" y="0"/>
+          <a:ext cx="0" cy="0"/>
+          <a:chOff x="0" y="0"/>
+          <a:chExt cx="0" cy="0"/>
+        </a:xfrm>
+      </p:grpSpPr>
+      <p:pic>
+        <p:nvPicPr>
+          <p:cNvPr id="1026" name="Picture 2"/>
+          <p:cNvPicPr>
+            <a:picLocks noChangeAspect="1" noChangeArrowheads="1"/>
+          </p:cNvPicPr>
+          <p:nvPr/>
+        </p:nvPicPr>
+        <p:blipFill rotWithShape="1">
+          <a:blip r:embed="rId2">
+            <a:extLst>
+              <a:ext uri="{28A0092B-C50C-407E-A947-70E740481C1C}">
+                <a14:useLocalDpi xmlns:a14="http://schemas.microsoft.com/office/drawing/2010/main" val="0"/>
+              </a:ext>
+            </a:extLst>
+          </a:blip>
+          <a:srcRect t="30577" r="9916"/>
+          <a:stretch/>
+        </p:blipFill>
+        <p:spPr bwMode="auto">
+          <a:xfrm>
+            <a:off x="609601" y="1131332"/>
+            <a:ext cx="5105400" cy="5276850"/>
+          </a:xfrm>
+          <a:prstGeom prst="rect">
+            <a:avLst/>
+          </a:prstGeom>
+          <a:noFill/>
+          <a:ln>
+            <a:noFill/>
+          </a:ln>
+          <a:extLst>
+            <a:ext uri="{909E8E84-426E-40DD-AFC4-6F175D3DCCD1}">
+              <a14:hiddenFill xmlns:a14="http://schemas.microsoft.com/office/drawing/2010/main">
+                <a:solidFill>
+                  <a:schemeClr val="accent1"/>
+                </a:solidFill>
+              </a14:hiddenFill>
+            </a:ext>
+            <a:ext uri="{91240B29-F687-4F45-9708-019B960494DF}">
+              <a14:hiddenLine xmlns:a14="http://schemas.microsoft.com/office/drawing/2010/main" w="9525">
+                <a:solidFill>
+                  <a:schemeClr val="tx1"/>
+                </a:solidFill>
+                <a:miter lim="800000"/>
+                <a:headEnd/>
+                <a:tailEnd/>
+              </a14:hiddenLine>
+            </a:ext>
+          </a:extLst>
+        </p:spPr>
+      </p:pic>
+      <p:sp>
+        <p:nvSpPr>
+          <p:cNvPr id="2" name="TextBox 1"/>
+          <p:cNvSpPr txBox="1"/>
+          <p:nvPr/>
+        </p:nvSpPr>
+        <p:spPr>
+          <a:xfrm>
+            <a:off x="381000" y="762000"/>
+            <a:ext cx="2728247" cy="369332"/>
+          </a:xfrm>
+          <a:prstGeom prst="rect">
+            <a:avLst/>
+          </a:prstGeom>
+          <a:noFill/>
+        </p:spPr>
+        <p:txBody>
+          <a:bodyPr wrap="none" rtlCol="0">
+            <a:spAutoFit/>
+          </a:bodyPr>
+          <a:lstStyle/>
+          <a:p>
+            <a:r>
+              <a:rPr lang="en-US" b="1" dirty="0" smtClean="0"/>
+              <a:t>April 2020 NEW SETTINGS:</a:t>
+            </a:r>
+            <a:endParaRPr lang="en-US" b="1" dirty="0"/>
+          </a:p>
+        </p:txBody>
+      </p:sp>
+      <p:sp>
+        <p:nvSpPr>
+          <p:cNvPr id="4" name="Right Brace 3"/>
+          <p:cNvSpPr/>
+          <p:nvPr/>
+        </p:nvSpPr>
+        <p:spPr>
+          <a:xfrm>
+            <a:off x="5791200" y="1140857"/>
+            <a:ext cx="228600" cy="4707493"/>
+          </a:xfrm>
+          <a:prstGeom prst="rightBrace">
+            <a:avLst>
+              <a:gd name="adj1" fmla="val 8333"/>
+              <a:gd name="adj2" fmla="val 88525"/>
+            </a:avLst>
+          </a:prstGeom>
+        </p:spPr>
+        <p:style>
+          <a:lnRef idx="1">
+            <a:schemeClr val="accent1"/>
+          </a:lnRef>
+          <a:fillRef idx="0">
+            <a:schemeClr val="accent1"/>
+          </a:fillRef>
+          <a:effectRef idx="0">
+            <a:schemeClr val="accent1"/>
+          </a:effectRef>
+          <a:fontRef idx="minor">
+            <a:schemeClr val="tx1"/>
+          </a:fontRef>
+        </p:style>
+        <p:txBody>
+          <a:bodyPr rtlCol="0" anchor="ctr"/>
+          <a:lstStyle/>
+          <a:p>
+            <a:pPr algn="ctr"/>
+            <a:endParaRPr lang="en-US"/>
+          </a:p>
+        </p:txBody>
+      </p:sp>
+      <p:sp>
+        <p:nvSpPr>
+          <p:cNvPr id="12" name="TextBox 11"/>
+          <p:cNvSpPr txBox="1"/>
+          <p:nvPr/>
+        </p:nvSpPr>
+        <p:spPr>
+          <a:xfrm>
+            <a:off x="6019800" y="4953000"/>
+            <a:ext cx="2590800" cy="646331"/>
+          </a:xfrm>
+          <a:prstGeom prst="rect">
+            <a:avLst/>
+          </a:prstGeom>
+          <a:noFill/>
+        </p:spPr>
+        <p:txBody>
+          <a:bodyPr wrap="square" rtlCol="0">
+            <a:spAutoFit/>
+          </a:bodyPr>
+          <a:lstStyle/>
+          <a:p>
+            <a:r>
+              <a:rPr lang="en-US" dirty="0" smtClean="0"/>
+              <a:t>10 NEW SETTINGS</a:t>
+            </a:r>
+          </a:p>
+          <a:p>
+            <a:r>
+              <a:rPr lang="en-US" dirty="0" smtClean="0"/>
+              <a:t>(explanation on the left)</a:t>
+            </a:r>
+            <a:endParaRPr lang="en-US" dirty="0"/>
+          </a:p>
+        </p:txBody>
+      </p:sp>
+      <p:pic>
+        <p:nvPicPr>
+          <p:cNvPr id="3074" name="Picture 2" descr="C:\Users\Pedro\Desktop\U_Root\0_linux_home\git\cmdr\docs\pics\icon\cmdr_icon.png"/>
+          <p:cNvPicPr>
+            <a:picLocks noChangeAspect="1" noChangeArrowheads="1"/>
+          </p:cNvPicPr>
+          <p:nvPr/>
+        </p:nvPicPr>
+        <p:blipFill>
+          <a:blip r:embed="rId3">
+            <a:extLst>
+              <a:ext uri="{28A0092B-C50C-407E-A947-70E740481C1C}">
+                <a14:useLocalDpi xmlns:a14="http://schemas.microsoft.com/office/drawing/2010/main" val="0"/>
+              </a:ext>
+            </a:extLst>
+          </a:blip>
+          <a:srcRect/>
+          <a:stretch>
+            <a:fillRect/>
+          </a:stretch>
+        </p:blipFill>
+        <p:spPr bwMode="auto">
+          <a:xfrm>
+            <a:off x="6362698" y="1140857"/>
+            <a:ext cx="2438401" cy="2438400"/>
+          </a:xfrm>
+          <a:prstGeom prst="rect">
+            <a:avLst/>
+          </a:prstGeom>
+          <a:noFill/>
+          <a:extLst>
+            <a:ext uri="{909E8E84-426E-40DD-AFC4-6F175D3DCCD1}">
+              <a14:hiddenFill xmlns:a14="http://schemas.microsoft.com/office/drawing/2010/main">
+                <a:solidFill>
+                  <a:srgbClr val="FFFFFF"/>
+                </a:solidFill>
+              </a14:hiddenFill>
+            </a:ext>
+          </a:extLst>
+        </p:spPr>
+      </p:pic>
+      <p:sp>
+        <p:nvSpPr>
+          <p:cNvPr id="8" name="TextBox 7"/>
+          <p:cNvSpPr txBox="1"/>
+          <p:nvPr/>
+        </p:nvSpPr>
+        <p:spPr>
+          <a:xfrm>
+            <a:off x="6019800" y="685800"/>
+            <a:ext cx="1073627" cy="369332"/>
+          </a:xfrm>
+          <a:prstGeom prst="rect">
+            <a:avLst/>
+          </a:prstGeom>
+          <a:noFill/>
+        </p:spPr>
+        <p:txBody>
+          <a:bodyPr wrap="none" rtlCol="0">
+            <a:spAutoFit/>
+          </a:bodyPr>
+          <a:lstStyle/>
+          <a:p>
+            <a:r>
+              <a:rPr lang="en-US" b="1" dirty="0" smtClean="0"/>
+              <a:t>New icon</a:t>
             </a:r>
             <a:endParaRPr lang="en-US" b="1" dirty="0"/>
           </a:p>
@@ -3123,7 +4085,333 @@
 </p:sld>
 </file>
 
-<file path=ppt/slides/slide4.xml><?xml version="1.0" encoding="utf-8"?>
+<file path=ppt/slides/slide5.xml><?xml version="1.0" encoding="utf-8"?>
+<p:sld xmlns:a="http://schemas.openxmlformats.org/drawingml/2006/main" xmlns:r="http://schemas.openxmlformats.org/officeDocument/2006/relationships" xmlns:p="http://schemas.openxmlformats.org/presentationml/2006/main">
+  <p:cSld>
+    <p:spTree>
+      <p:nvGrpSpPr>
+        <p:cNvPr id="1" name=""/>
+        <p:cNvGrpSpPr/>
+        <p:nvPr/>
+      </p:nvGrpSpPr>
+      <p:grpSpPr>
+        <a:xfrm>
+          <a:off x="0" y="0"/>
+          <a:ext cx="0" cy="0"/>
+          <a:chOff x="0" y="0"/>
+          <a:chExt cx="0" cy="0"/>
+        </a:xfrm>
+      </p:grpSpPr>
+      <p:sp>
+        <p:nvSpPr>
+          <p:cNvPr id="2" name="TextBox 1"/>
+          <p:cNvSpPr txBox="1"/>
+          <p:nvPr/>
+        </p:nvSpPr>
+        <p:spPr>
+          <a:xfrm>
+            <a:off x="152400" y="762000"/>
+            <a:ext cx="3894912" cy="646331"/>
+          </a:xfrm>
+          <a:prstGeom prst="rect">
+            <a:avLst/>
+          </a:prstGeom>
+          <a:noFill/>
+        </p:spPr>
+        <p:txBody>
+          <a:bodyPr wrap="none" rtlCol="0">
+            <a:spAutoFit/>
+          </a:bodyPr>
+          <a:lstStyle/>
+          <a:p>
+            <a:r>
+              <a:rPr lang="en-US" b="1" dirty="0" smtClean="0"/>
+              <a:t>SHOWS ALL COMMANDS IN ALL PAGES</a:t>
+            </a:r>
+            <a:br>
+              <a:rPr lang="en-US" b="1" dirty="0" smtClean="0"/>
+            </a:br>
+            <a:r>
+              <a:rPr lang="en-US" b="1" dirty="0" smtClean="0"/>
+              <a:t>Answers “where is command X”</a:t>
+            </a:r>
+            <a:endParaRPr lang="en-US" b="1" dirty="0"/>
+          </a:p>
+        </p:txBody>
+      </p:sp>
+      <p:pic>
+        <p:nvPicPr>
+          <p:cNvPr id="3" name="Picture 2"/>
+          <p:cNvPicPr>
+            <a:picLocks noChangeAspect="1" noChangeArrowheads="1"/>
+          </p:cNvPicPr>
+          <p:nvPr/>
+        </p:nvPicPr>
+        <p:blipFill rotWithShape="1">
+          <a:blip r:embed="rId2">
+            <a:extLst>
+              <a:ext uri="{28A0092B-C50C-407E-A947-70E740481C1C}">
+                <a14:useLocalDpi xmlns:a14="http://schemas.microsoft.com/office/drawing/2010/main" val="0"/>
+              </a:ext>
+            </a:extLst>
+          </a:blip>
+          <a:srcRect l="1354" t="1834" r="23984" b="19710"/>
+          <a:stretch/>
+        </p:blipFill>
+        <p:spPr bwMode="auto">
+          <a:xfrm>
+            <a:off x="4886324" y="1447800"/>
+            <a:ext cx="3676651" cy="3669268"/>
+          </a:xfrm>
+          <a:prstGeom prst="rect">
+            <a:avLst/>
+          </a:prstGeom>
+          <a:noFill/>
+          <a:ln>
+            <a:noFill/>
+          </a:ln>
+          <a:extLst>
+            <a:ext uri="{909E8E84-426E-40DD-AFC4-6F175D3DCCD1}">
+              <a14:hiddenFill xmlns:a14="http://schemas.microsoft.com/office/drawing/2010/main">
+                <a:solidFill>
+                  <a:schemeClr val="accent1"/>
+                </a:solidFill>
+              </a14:hiddenFill>
+            </a:ext>
+            <a:ext uri="{91240B29-F687-4F45-9708-019B960494DF}">
+              <a14:hiddenLine xmlns:a14="http://schemas.microsoft.com/office/drawing/2010/main" w="9525">
+                <a:solidFill>
+                  <a:schemeClr val="tx1"/>
+                </a:solidFill>
+                <a:miter lim="800000"/>
+                <a:headEnd/>
+                <a:tailEnd/>
+              </a14:hiddenLine>
+            </a:ext>
+          </a:extLst>
+        </p:spPr>
+      </p:pic>
+      <p:pic>
+        <p:nvPicPr>
+          <p:cNvPr id="1027" name="Picture 3"/>
+          <p:cNvPicPr>
+            <a:picLocks noChangeAspect="1" noChangeArrowheads="1"/>
+          </p:cNvPicPr>
+          <p:nvPr/>
+        </p:nvPicPr>
+        <p:blipFill rotWithShape="1">
+          <a:blip r:embed="rId3">
+            <a:extLst>
+              <a:ext uri="{28A0092B-C50C-407E-A947-70E740481C1C}">
+                <a14:useLocalDpi xmlns:a14="http://schemas.microsoft.com/office/drawing/2010/main" val="0"/>
+              </a:ext>
+            </a:extLst>
+          </a:blip>
+          <a:srcRect l="2305" t="3090" r="21911" b="24089"/>
+          <a:stretch/>
+        </p:blipFill>
+        <p:spPr bwMode="auto">
+          <a:xfrm>
+            <a:off x="228600" y="1447800"/>
+            <a:ext cx="4381500" cy="3669268"/>
+          </a:xfrm>
+          <a:prstGeom prst="rect">
+            <a:avLst/>
+          </a:prstGeom>
+          <a:noFill/>
+          <a:ln>
+            <a:noFill/>
+          </a:ln>
+          <a:extLst>
+            <a:ext uri="{909E8E84-426E-40DD-AFC4-6F175D3DCCD1}">
+              <a14:hiddenFill xmlns:a14="http://schemas.microsoft.com/office/drawing/2010/main">
+                <a:solidFill>
+                  <a:schemeClr val="accent1"/>
+                </a:solidFill>
+              </a14:hiddenFill>
+            </a:ext>
+            <a:ext uri="{91240B29-F687-4F45-9708-019B960494DF}">
+              <a14:hiddenLine xmlns:a14="http://schemas.microsoft.com/office/drawing/2010/main" w="9525">
+                <a:solidFill>
+                  <a:schemeClr val="tx1"/>
+                </a:solidFill>
+                <a:miter lim="800000"/>
+                <a:headEnd/>
+                <a:tailEnd/>
+              </a14:hiddenLine>
+            </a:ext>
+          </a:extLst>
+        </p:spPr>
+      </p:pic>
+      <p:sp>
+        <p:nvSpPr>
+          <p:cNvPr id="9" name="TextBox 8"/>
+          <p:cNvSpPr txBox="1"/>
+          <p:nvPr/>
+        </p:nvSpPr>
+        <p:spPr>
+          <a:xfrm>
+            <a:off x="4886324" y="761999"/>
+            <a:ext cx="3189976" cy="646331"/>
+          </a:xfrm>
+          <a:prstGeom prst="rect">
+            <a:avLst/>
+          </a:prstGeom>
+          <a:noFill/>
+        </p:spPr>
+        <p:txBody>
+          <a:bodyPr wrap="none" rtlCol="0">
+            <a:spAutoFit/>
+          </a:bodyPr>
+          <a:lstStyle/>
+          <a:p>
+            <a:r>
+              <a:rPr lang="en-US" b="1" dirty="0" smtClean="0"/>
+              <a:t>SHOWS ALL CONDITIONS</a:t>
+            </a:r>
+          </a:p>
+          <a:p>
+            <a:r>
+              <a:rPr lang="en-US" b="1" dirty="0" smtClean="0"/>
+              <a:t>Useful to find unused modifiers</a:t>
+            </a:r>
+            <a:endParaRPr lang="en-US" b="1" dirty="0"/>
+          </a:p>
+        </p:txBody>
+      </p:sp>
+    </p:spTree>
+    <p:extLst>
+      <p:ext uri="{BB962C8B-B14F-4D97-AF65-F5344CB8AC3E}">
+        <p14:creationId xmlns:p14="http://schemas.microsoft.com/office/powerpoint/2010/main" val="3455916407"/>
+      </p:ext>
+    </p:extLst>
+  </p:cSld>
+  <p:clrMapOvr>
+    <a:masterClrMapping/>
+  </p:clrMapOvr>
+</p:sld>
+</file>
+
+<file path=ppt/slides/slide6.xml><?xml version="1.0" encoding="utf-8"?>
+<p:sld xmlns:a="http://schemas.openxmlformats.org/drawingml/2006/main" xmlns:r="http://schemas.openxmlformats.org/officeDocument/2006/relationships" xmlns:p="http://schemas.openxmlformats.org/presentationml/2006/main">
+  <p:cSld>
+    <p:spTree>
+      <p:nvGrpSpPr>
+        <p:cNvPr id="1" name=""/>
+        <p:cNvGrpSpPr/>
+        <p:nvPr/>
+      </p:nvGrpSpPr>
+      <p:grpSpPr>
+        <a:xfrm>
+          <a:off x="0" y="0"/>
+          <a:ext cx="0" cy="0"/>
+          <a:chOff x="0" y="0"/>
+          <a:chExt cx="0" cy="0"/>
+        </a:xfrm>
+      </p:grpSpPr>
+      <p:pic>
+        <p:nvPicPr>
+          <p:cNvPr id="2051" name="Picture 3"/>
+          <p:cNvPicPr>
+            <a:picLocks noChangeAspect="1" noChangeArrowheads="1"/>
+          </p:cNvPicPr>
+          <p:nvPr/>
+        </p:nvPicPr>
+        <p:blipFill rotWithShape="1">
+          <a:blip r:embed="rId2">
+            <a:extLst>
+              <a:ext uri="{28A0092B-C50C-407E-A947-70E740481C1C}">
+                <a14:useLocalDpi xmlns:a14="http://schemas.microsoft.com/office/drawing/2010/main" val="0"/>
+              </a:ext>
+            </a:extLst>
+          </a:blip>
+          <a:srcRect b="25455"/>
+          <a:stretch/>
+        </p:blipFill>
+        <p:spPr bwMode="auto">
+          <a:xfrm>
+            <a:off x="1143000" y="990600"/>
+            <a:ext cx="6432566" cy="4114800"/>
+          </a:xfrm>
+          <a:prstGeom prst="rect">
+            <a:avLst/>
+          </a:prstGeom>
+          <a:noFill/>
+          <a:ln>
+            <a:noFill/>
+          </a:ln>
+          <a:extLst>
+            <a:ext uri="{909E8E84-426E-40DD-AFC4-6F175D3DCCD1}">
+              <a14:hiddenFill xmlns:a14="http://schemas.microsoft.com/office/drawing/2010/main">
+                <a:solidFill>
+                  <a:schemeClr val="accent1"/>
+                </a:solidFill>
+              </a14:hiddenFill>
+            </a:ext>
+            <a:ext uri="{91240B29-F687-4F45-9708-019B960494DF}">
+              <a14:hiddenLine xmlns:a14="http://schemas.microsoft.com/office/drawing/2010/main" w="9525">
+                <a:solidFill>
+                  <a:schemeClr val="tx1"/>
+                </a:solidFill>
+                <a:miter lim="800000"/>
+                <a:headEnd/>
+                <a:tailEnd/>
+              </a14:hiddenLine>
+            </a:ext>
+          </a:extLst>
+        </p:spPr>
+      </p:pic>
+      <p:sp>
+        <p:nvSpPr>
+          <p:cNvPr id="3" name="TextBox 2"/>
+          <p:cNvSpPr txBox="1"/>
+          <p:nvPr/>
+        </p:nvSpPr>
+        <p:spPr>
+          <a:xfrm>
+            <a:off x="838200" y="597932"/>
+            <a:ext cx="3776034" cy="369332"/>
+          </a:xfrm>
+          <a:prstGeom prst="rect">
+            <a:avLst/>
+          </a:prstGeom>
+          <a:noFill/>
+        </p:spPr>
+        <p:txBody>
+          <a:bodyPr wrap="none" rtlCol="0">
+            <a:spAutoFit/>
+          </a:bodyPr>
+          <a:lstStyle/>
+          <a:p>
+            <a:r>
+              <a:rPr lang="en-US" b="1" dirty="0" smtClean="0"/>
+              <a:t>CSV EXPORT (useful for diff, grep, </a:t>
+            </a:r>
+            <a:r>
+              <a:rPr lang="en-US" b="1" dirty="0" err="1" smtClean="0"/>
+              <a:t>etc</a:t>
+            </a:r>
+            <a:r>
+              <a:rPr lang="en-US" b="1" dirty="0" smtClean="0"/>
+              <a:t>)</a:t>
+            </a:r>
+          </a:p>
+        </p:txBody>
+      </p:sp>
+    </p:spTree>
+    <p:extLst>
+      <p:ext uri="{BB962C8B-B14F-4D97-AF65-F5344CB8AC3E}">
+        <p14:creationId xmlns:p14="http://schemas.microsoft.com/office/powerpoint/2010/main" val="1933597634"/>
+      </p:ext>
+    </p:extLst>
+  </p:cSld>
+  <p:clrMapOvr>
+    <a:masterClrMapping/>
+  </p:clrMapOvr>
+</p:sld>
+</file>
+
+<file path=ppt/slides/slide7.xml><?xml version="1.0" encoding="utf-8"?>
 <p:sld xmlns:a="http://schemas.openxmlformats.org/drawingml/2006/main" xmlns:r="http://schemas.openxmlformats.org/officeDocument/2006/relationships" xmlns:p="http://schemas.openxmlformats.org/presentationml/2006/main">
   <p:cSld>
     <p:spTree>
@@ -5616,331 +6904,142 @@
           </a:extLst>
         </p:spPr>
       </p:pic>
+      <p:sp>
+        <p:nvSpPr>
+          <p:cNvPr id="59" name="TextBox 58"/>
+          <p:cNvSpPr txBox="1"/>
+          <p:nvPr/>
+        </p:nvSpPr>
+        <p:spPr>
+          <a:xfrm>
+            <a:off x="3945087" y="3937826"/>
+            <a:ext cx="609072" cy="153888"/>
+          </a:xfrm>
+          <a:prstGeom prst="rect">
+            <a:avLst/>
+          </a:prstGeom>
+        </p:spPr>
+        <p:style>
+          <a:lnRef idx="1">
+            <a:schemeClr val="accent4"/>
+          </a:lnRef>
+          <a:fillRef idx="2">
+            <a:schemeClr val="accent4"/>
+          </a:fillRef>
+          <a:effectRef idx="1">
+            <a:schemeClr val="accent4"/>
+          </a:effectRef>
+          <a:fontRef idx="minor">
+            <a:schemeClr val="dk1"/>
+          </a:fontRef>
+        </p:style>
+        <p:txBody>
+          <a:bodyPr wrap="square" lIns="0" tIns="0" rIns="0" bIns="0" rtlCol="0">
+            <a:spAutoFit/>
+          </a:bodyPr>
+          <a:lstStyle/>
+          <a:p>
+            <a:pPr algn="ctr"/>
+            <a:r>
+              <a:rPr lang="en-US" sz="1000" dirty="0" smtClean="0"/>
+              <a:t>8x pads</a:t>
+            </a:r>
+            <a:endParaRPr lang="en-US" sz="1000" dirty="0" smtClean="0"/>
+          </a:p>
+        </p:txBody>
+      </p:sp>
+      <p:sp>
+        <p:nvSpPr>
+          <p:cNvPr id="61" name="TextBox 60"/>
+          <p:cNvSpPr txBox="1"/>
+          <p:nvPr/>
+        </p:nvSpPr>
+        <p:spPr>
+          <a:xfrm>
+            <a:off x="3945087" y="3783938"/>
+            <a:ext cx="609072" cy="153888"/>
+          </a:xfrm>
+          <a:prstGeom prst="rect">
+            <a:avLst/>
+          </a:prstGeom>
+        </p:spPr>
+        <p:style>
+          <a:lnRef idx="1">
+            <a:schemeClr val="accent1"/>
+          </a:lnRef>
+          <a:fillRef idx="2">
+            <a:schemeClr val="accent1"/>
+          </a:fillRef>
+          <a:effectRef idx="1">
+            <a:schemeClr val="accent1"/>
+          </a:effectRef>
+          <a:fontRef idx="minor">
+            <a:schemeClr val="dk1"/>
+          </a:fontRef>
+        </p:style>
+        <p:txBody>
+          <a:bodyPr wrap="square" lIns="0" tIns="0" rIns="0" bIns="0" rtlCol="0">
+            <a:spAutoFit/>
+          </a:bodyPr>
+          <a:lstStyle/>
+          <a:p>
+            <a:pPr algn="ctr"/>
+            <a:r>
+              <a:rPr lang="en-US" sz="1000" dirty="0" smtClean="0"/>
+              <a:t>4x channels</a:t>
+            </a:r>
+            <a:endParaRPr lang="en-US" sz="1000" dirty="0" smtClean="0"/>
+          </a:p>
+        </p:txBody>
+      </p:sp>
+      <p:sp>
+        <p:nvSpPr>
+          <p:cNvPr id="63" name="TextBox 62"/>
+          <p:cNvSpPr txBox="1"/>
+          <p:nvPr/>
+        </p:nvSpPr>
+        <p:spPr>
+          <a:xfrm>
+            <a:off x="3336015" y="3795052"/>
+            <a:ext cx="509281" cy="153888"/>
+          </a:xfrm>
+          <a:prstGeom prst="rect">
+            <a:avLst/>
+          </a:prstGeom>
+        </p:spPr>
+        <p:style>
+          <a:lnRef idx="1">
+            <a:schemeClr val="accent1"/>
+          </a:lnRef>
+          <a:fillRef idx="2">
+            <a:schemeClr val="accent1"/>
+          </a:fillRef>
+          <a:effectRef idx="1">
+            <a:schemeClr val="accent1"/>
+          </a:effectRef>
+          <a:fontRef idx="minor">
+            <a:schemeClr val="dk1"/>
+          </a:fontRef>
+        </p:style>
+        <p:txBody>
+          <a:bodyPr wrap="square" lIns="0" tIns="0" rIns="0" bIns="0" rtlCol="0">
+            <a:spAutoFit/>
+          </a:bodyPr>
+          <a:lstStyle/>
+          <a:p>
+            <a:pPr algn="ctr"/>
+            <a:r>
+              <a:rPr lang="en-US" sz="1000" dirty="0" smtClean="0"/>
+              <a:t>remove</a:t>
+            </a:r>
+            <a:endParaRPr lang="en-US" sz="1000" dirty="0" smtClean="0"/>
+          </a:p>
+        </p:txBody>
+      </p:sp>
     </p:spTree>
     <p:extLst>
       <p:ext uri="{BB962C8B-B14F-4D97-AF65-F5344CB8AC3E}">
         <p14:creationId xmlns:p14="http://schemas.microsoft.com/office/powerpoint/2010/main" val="2051765938"/>
-      </p:ext>
-    </p:extLst>
-  </p:cSld>
-  <p:clrMapOvr>
-    <a:masterClrMapping/>
-  </p:clrMapOvr>
-</p:sld>
-</file>
-
-<file path=ppt/slides/slide5.xml><?xml version="1.0" encoding="utf-8"?>
-<p:sld xmlns:a="http://schemas.openxmlformats.org/drawingml/2006/main" xmlns:r="http://schemas.openxmlformats.org/officeDocument/2006/relationships" xmlns:p="http://schemas.openxmlformats.org/presentationml/2006/main">
-  <p:cSld>
-    <p:spTree>
-      <p:nvGrpSpPr>
-        <p:cNvPr id="1" name=""/>
-        <p:cNvGrpSpPr/>
-        <p:nvPr/>
-      </p:nvGrpSpPr>
-      <p:grpSpPr>
-        <a:xfrm>
-          <a:off x="0" y="0"/>
-          <a:ext cx="0" cy="0"/>
-          <a:chOff x="0" y="0"/>
-          <a:chExt cx="0" cy="0"/>
-        </a:xfrm>
-      </p:grpSpPr>
-      <p:pic>
-        <p:nvPicPr>
-          <p:cNvPr id="1027" name="Picture 3" descr="C:\Users\Pedro\Desktop\Z_DRIVE_Pedro\2 Music - Controllers\0_TSI_Traktor\z_other mappings made by pedro\1 DJ Sets Preparation\keyboard template 2.jpg"/>
-          <p:cNvPicPr>
-            <a:picLocks noChangeAspect="1" noChangeArrowheads="1"/>
-          </p:cNvPicPr>
-          <p:nvPr/>
-        </p:nvPicPr>
-        <p:blipFill rotWithShape="1">
-          <a:blip r:embed="rId2">
-            <a:extLst>
-              <a:ext uri="{28A0092B-C50C-407E-A947-70E740481C1C}">
-                <a14:useLocalDpi xmlns:a14="http://schemas.microsoft.com/office/drawing/2010/main" val="0"/>
-              </a:ext>
-            </a:extLst>
-          </a:blip>
-          <a:srcRect l="2896" t="31096" r="3277" b="5793"/>
-          <a:stretch/>
-        </p:blipFill>
-        <p:spPr bwMode="auto">
-          <a:xfrm>
-            <a:off x="381000" y="190500"/>
-            <a:ext cx="18579180" cy="6248400"/>
-          </a:xfrm>
-          <a:prstGeom prst="rect">
-            <a:avLst/>
-          </a:prstGeom>
-          <a:noFill/>
-          <a:extLst>
-            <a:ext uri="{909E8E84-426E-40DD-AFC4-6F175D3DCCD1}">
-              <a14:hiddenFill xmlns:a14="http://schemas.microsoft.com/office/drawing/2010/main">
-                <a:solidFill>
-                  <a:srgbClr val="FFFFFF"/>
-                </a:solidFill>
-              </a14:hiddenFill>
-            </a:ext>
-          </a:extLst>
-        </p:spPr>
-      </p:pic>
-    </p:spTree>
-    <p:extLst>
-      <p:ext uri="{BB962C8B-B14F-4D97-AF65-F5344CB8AC3E}">
-        <p14:creationId xmlns:p14="http://schemas.microsoft.com/office/powerpoint/2010/main" val="1939138872"/>
-      </p:ext>
-    </p:extLst>
-  </p:cSld>
-  <p:clrMapOvr>
-    <a:masterClrMapping/>
-  </p:clrMapOvr>
-</p:sld>
-</file>
-
-<file path=ppt/slides/slide6.xml><?xml version="1.0" encoding="utf-8"?>
-<p:sld xmlns:a="http://schemas.openxmlformats.org/drawingml/2006/main" xmlns:r="http://schemas.openxmlformats.org/officeDocument/2006/relationships" xmlns:p="http://schemas.openxmlformats.org/presentationml/2006/main">
-  <p:cSld>
-    <p:spTree>
-      <p:nvGrpSpPr>
-        <p:cNvPr id="1" name=""/>
-        <p:cNvGrpSpPr/>
-        <p:nvPr/>
-      </p:nvGrpSpPr>
-      <p:grpSpPr>
-        <a:xfrm>
-          <a:off x="0" y="0"/>
-          <a:ext cx="0" cy="0"/>
-          <a:chOff x="0" y="0"/>
-          <a:chExt cx="0" cy="0"/>
-        </a:xfrm>
-      </p:grpSpPr>
-      <p:pic>
-        <p:nvPicPr>
-          <p:cNvPr id="1026" name="Picture 2" descr="C:\Users\Pedro\Desktop\Z_DRIVE_Pedro\2 Music - Controllers\0_TSI_Traktor\z_other mappings made by pedro\1 DJ Sets Preparation\keyboard template 1.png"/>
-          <p:cNvPicPr>
-            <a:picLocks noChangeAspect="1" noChangeArrowheads="1"/>
-          </p:cNvPicPr>
-          <p:nvPr/>
-        </p:nvPicPr>
-        <p:blipFill>
-          <a:blip r:embed="rId2">
-            <a:extLst>
-              <a:ext uri="{28A0092B-C50C-407E-A947-70E740481C1C}">
-                <a14:useLocalDpi xmlns:a14="http://schemas.microsoft.com/office/drawing/2010/main" val="0"/>
-              </a:ext>
-            </a:extLst>
-          </a:blip>
-          <a:srcRect/>
-          <a:stretch>
-            <a:fillRect/>
-          </a:stretch>
-        </p:blipFill>
-        <p:spPr bwMode="auto">
-          <a:xfrm>
-            <a:off x="-838200" y="-762000"/>
-            <a:ext cx="17515900" cy="6897688"/>
-          </a:xfrm>
-          <a:prstGeom prst="rect">
-            <a:avLst/>
-          </a:prstGeom>
-          <a:noFill/>
-          <a:extLst>
-            <a:ext uri="{909E8E84-426E-40DD-AFC4-6F175D3DCCD1}">
-              <a14:hiddenFill xmlns:a14="http://schemas.microsoft.com/office/drawing/2010/main">
-                <a:solidFill>
-                  <a:srgbClr val="FFFFFF"/>
-                </a:solidFill>
-              </a14:hiddenFill>
-            </a:ext>
-          </a:extLst>
-        </p:spPr>
-      </p:pic>
-    </p:spTree>
-    <p:extLst>
-      <p:ext uri="{BB962C8B-B14F-4D97-AF65-F5344CB8AC3E}">
-        <p14:creationId xmlns:p14="http://schemas.microsoft.com/office/powerpoint/2010/main" val="668178066"/>
-      </p:ext>
-    </p:extLst>
-  </p:cSld>
-  <p:clrMapOvr>
-    <a:masterClrMapping/>
-  </p:clrMapOvr>
-</p:sld>
-</file>
-
-<file path=ppt/slides/slide7.xml><?xml version="1.0" encoding="utf-8"?>
-<p:sld xmlns:a="http://schemas.openxmlformats.org/drawingml/2006/main" xmlns:r="http://schemas.openxmlformats.org/officeDocument/2006/relationships" xmlns:p="http://schemas.openxmlformats.org/presentationml/2006/main">
-  <p:cSld>
-    <p:spTree>
-      <p:nvGrpSpPr>
-        <p:cNvPr id="1" name=""/>
-        <p:cNvGrpSpPr/>
-        <p:nvPr/>
-      </p:nvGrpSpPr>
-      <p:grpSpPr>
-        <a:xfrm>
-          <a:off x="0" y="0"/>
-          <a:ext cx="0" cy="0"/>
-          <a:chOff x="0" y="0"/>
-          <a:chExt cx="0" cy="0"/>
-        </a:xfrm>
-      </p:grpSpPr>
-      <p:sp>
-        <p:nvSpPr>
-          <p:cNvPr id="4" name="Rectangle 3"/>
-          <p:cNvSpPr/>
-          <p:nvPr/>
-        </p:nvSpPr>
-        <p:spPr>
-          <a:xfrm>
-            <a:off x="1981200" y="1295400"/>
-            <a:ext cx="3124200" cy="2514600"/>
-          </a:xfrm>
-          <a:prstGeom prst="rect">
-            <a:avLst/>
-          </a:prstGeom>
-          <a:solidFill>
-            <a:schemeClr val="bg1"/>
-          </a:solidFill>
-          <a:ln>
-            <a:noFill/>
-          </a:ln>
-        </p:spPr>
-        <p:style>
-          <a:lnRef idx="2">
-            <a:schemeClr val="accent1">
-              <a:shade val="50000"/>
-            </a:schemeClr>
-          </a:lnRef>
-          <a:fillRef idx="1">
-            <a:schemeClr val="accent1"/>
-          </a:fillRef>
-          <a:effectRef idx="0">
-            <a:schemeClr val="accent1"/>
-          </a:effectRef>
-          <a:fontRef idx="minor">
-            <a:schemeClr val="lt1"/>
-          </a:fontRef>
-        </p:style>
-        <p:txBody>
-          <a:bodyPr rtlCol="0" anchor="ctr"/>
-          <a:lstStyle/>
-          <a:p>
-            <a:pPr algn="ctr"/>
-            <a:endParaRPr lang="en-US"/>
-          </a:p>
-        </p:txBody>
-      </p:sp>
-      <p:pic>
-        <p:nvPicPr>
-          <p:cNvPr id="1026" name="Picture 2" descr="C:\Users\Pedro\Desktop\U_Root\0_linux_home\git\cmdr\docs\pics\src\icon\tsi_icon.png"/>
-          <p:cNvPicPr>
-            <a:picLocks noChangeAspect="1" noChangeArrowheads="1"/>
-          </p:cNvPicPr>
-          <p:nvPr/>
-        </p:nvPicPr>
-        <p:blipFill>
-          <a:blip r:embed="rId2">
-            <a:extLst>
-              <a:ext uri="{28A0092B-C50C-407E-A947-70E740481C1C}">
-                <a14:useLocalDpi xmlns:a14="http://schemas.microsoft.com/office/drawing/2010/main" val="0"/>
-              </a:ext>
-            </a:extLst>
-          </a:blip>
-          <a:srcRect/>
-          <a:stretch>
-            <a:fillRect/>
-          </a:stretch>
-        </p:blipFill>
-        <p:spPr bwMode="auto">
-          <a:xfrm>
-            <a:off x="2895600" y="1752600"/>
-            <a:ext cx="1171575" cy="1466850"/>
-          </a:xfrm>
-          <a:prstGeom prst="rect">
-            <a:avLst/>
-          </a:prstGeom>
-          <a:noFill/>
-          <a:extLst>
-            <a:ext uri="{909E8E84-426E-40DD-AFC4-6F175D3DCCD1}">
-              <a14:hiddenFill xmlns:a14="http://schemas.microsoft.com/office/drawing/2010/main">
-                <a:solidFill>
-                  <a:srgbClr val="FFFFFF"/>
-                </a:solidFill>
-              </a14:hiddenFill>
-            </a:ext>
-          </a:extLst>
-        </p:spPr>
-      </p:pic>
-      <p:pic>
-        <p:nvPicPr>
-          <p:cNvPr id="1027" name="Picture 3"/>
-          <p:cNvPicPr>
-            <a:picLocks noChangeAspect="1" noChangeArrowheads="1"/>
-          </p:cNvPicPr>
-          <p:nvPr/>
-        </p:nvPicPr>
-        <p:blipFill>
-          <a:blip r:embed="rId3" cstate="print">
-            <a:clrChange>
-              <a:clrFrom>
-                <a:srgbClr val="F8FAFB"/>
-              </a:clrFrom>
-              <a:clrTo>
-                <a:srgbClr val="F8FAFB">
-                  <a:alpha val="0"/>
-                </a:srgbClr>
-              </a:clrTo>
-            </a:clrChange>
-            <a:extLst>
-              <a:ext uri="{28A0092B-C50C-407E-A947-70E740481C1C}">
-                <a14:useLocalDpi xmlns:a14="http://schemas.microsoft.com/office/drawing/2010/main" val="0"/>
-              </a:ext>
-            </a:extLst>
-          </a:blip>
-          <a:srcRect/>
-          <a:stretch>
-            <a:fillRect/>
-          </a:stretch>
-        </p:blipFill>
-        <p:spPr bwMode="auto">
-          <a:xfrm>
-            <a:off x="2743200" y="1676400"/>
-            <a:ext cx="838200" cy="808686"/>
-          </a:xfrm>
-          <a:prstGeom prst="rect">
-            <a:avLst/>
-          </a:prstGeom>
-          <a:noFill/>
-          <a:ln>
-            <a:noFill/>
-          </a:ln>
-          <a:extLst>
-            <a:ext uri="{909E8E84-426E-40DD-AFC4-6F175D3DCCD1}">
-              <a14:hiddenFill xmlns:a14="http://schemas.microsoft.com/office/drawing/2010/main">
-                <a:solidFill>
-                  <a:schemeClr val="accent1"/>
-                </a:solidFill>
-              </a14:hiddenFill>
-            </a:ext>
-            <a:ext uri="{91240B29-F687-4F45-9708-019B960494DF}">
-              <a14:hiddenLine xmlns:a14="http://schemas.microsoft.com/office/drawing/2010/main" w="9525">
-                <a:solidFill>
-                  <a:schemeClr val="tx1"/>
-                </a:solidFill>
-                <a:miter lim="800000"/>
-                <a:headEnd/>
-                <a:tailEnd/>
-              </a14:hiddenLine>
-            </a:ext>
-          </a:extLst>
-        </p:spPr>
-      </p:pic>
-    </p:spTree>
-    <p:extLst>
-      <p:ext uri="{BB962C8B-B14F-4D97-AF65-F5344CB8AC3E}">
-        <p14:creationId xmlns:p14="http://schemas.microsoft.com/office/powerpoint/2010/main" val="1933597634"/>
       </p:ext>
     </p:extLst>
   </p:cSld>

</xml_diff>

<commit_message>
Ctrl_shift+R: Search/replace in comments
</commit_message>
<xml_diff>
--- a/docs/pics/src/cmdr slides.pptx
+++ b/docs/pics/src/cmdr slides.pptx
@@ -3803,6 +3803,138 @@
                 </a:solidFill>
               </a:rPr>
               <a:t>channel+note</a:t>
+            </a:r>
+            <a:endParaRPr lang="en-US" sz="1200" dirty="0">
+              <a:solidFill>
+                <a:schemeClr val="tx1"/>
+              </a:solidFill>
+            </a:endParaRPr>
+          </a:p>
+        </p:txBody>
+      </p:sp>
+      <p:sp>
+        <p:nvSpPr>
+          <p:cNvPr id="18" name="Line Callout 1 (Accent Bar) 17"/>
+          <p:cNvSpPr/>
+          <p:nvPr/>
+        </p:nvSpPr>
+        <p:spPr>
+          <a:xfrm>
+            <a:off x="7010400" y="5467350"/>
+            <a:ext cx="1219200" cy="180594"/>
+          </a:xfrm>
+          <a:prstGeom prst="accentCallout1">
+            <a:avLst>
+              <a:gd name="adj1" fmla="val 45417"/>
+              <a:gd name="adj2" fmla="val -2669"/>
+              <a:gd name="adj3" fmla="val -553948"/>
+              <a:gd name="adj4" fmla="val -35188"/>
+            </a:avLst>
+          </a:prstGeom>
+          <a:noFill/>
+          <a:ln>
+            <a:solidFill>
+              <a:schemeClr val="accent2"/>
+            </a:solidFill>
+          </a:ln>
+        </p:spPr>
+        <p:style>
+          <a:lnRef idx="2">
+            <a:schemeClr val="accent1">
+              <a:shade val="50000"/>
+            </a:schemeClr>
+          </a:lnRef>
+          <a:fillRef idx="1">
+            <a:schemeClr val="accent1"/>
+          </a:fillRef>
+          <a:effectRef idx="0">
+            <a:schemeClr val="accent1"/>
+          </a:effectRef>
+          <a:fontRef idx="minor">
+            <a:schemeClr val="lt1"/>
+          </a:fontRef>
+        </p:style>
+        <p:txBody>
+          <a:bodyPr lIns="0" tIns="0" rIns="0" bIns="0" rtlCol="0" anchor="ctr"/>
+          <a:lstStyle/>
+          <a:p>
+            <a:r>
+              <a:rPr lang="en-US" sz="1200" dirty="0" err="1" smtClean="0">
+                <a:solidFill>
+                  <a:schemeClr val="tx1"/>
+                </a:solidFill>
+              </a:rPr>
+              <a:t>MidiOUT</a:t>
+            </a:r>
+            <a:r>
+              <a:rPr lang="en-US" sz="1200" dirty="0" smtClean="0">
+                <a:solidFill>
+                  <a:schemeClr val="tx1"/>
+                </a:solidFill>
+              </a:rPr>
+              <a:t> no scrollbar!</a:t>
+            </a:r>
+            <a:endParaRPr lang="en-US" sz="1200" dirty="0">
+              <a:solidFill>
+                <a:schemeClr val="tx1"/>
+              </a:solidFill>
+            </a:endParaRPr>
+          </a:p>
+        </p:txBody>
+      </p:sp>
+      <p:sp>
+        <p:nvSpPr>
+          <p:cNvPr id="19" name="Line Callout 1 (Accent Bar) 18"/>
+          <p:cNvSpPr/>
+          <p:nvPr/>
+        </p:nvSpPr>
+        <p:spPr>
+          <a:xfrm>
+            <a:off x="6804528" y="905798"/>
+            <a:ext cx="1532390" cy="287564"/>
+          </a:xfrm>
+          <a:prstGeom prst="accentCallout1">
+            <a:avLst>
+              <a:gd name="adj1" fmla="val 45417"/>
+              <a:gd name="adj2" fmla="val -2669"/>
+              <a:gd name="adj3" fmla="val 537801"/>
+              <a:gd name="adj4" fmla="val -29413"/>
+            </a:avLst>
+          </a:prstGeom>
+          <a:noFill/>
+          <a:ln>
+            <a:solidFill>
+              <a:schemeClr val="accent2"/>
+            </a:solidFill>
+          </a:ln>
+        </p:spPr>
+        <p:style>
+          <a:lnRef idx="2">
+            <a:schemeClr val="accent1">
+              <a:shade val="50000"/>
+            </a:schemeClr>
+          </a:lnRef>
+          <a:fillRef idx="1">
+            <a:schemeClr val="accent1"/>
+          </a:fillRef>
+          <a:effectRef idx="0">
+            <a:schemeClr val="accent1"/>
+          </a:effectRef>
+          <a:fontRef idx="minor">
+            <a:schemeClr val="lt1"/>
+          </a:fontRef>
+        </p:style>
+        <p:txBody>
+          <a:bodyPr lIns="0" tIns="0" rIns="0" bIns="0" rtlCol="0" anchor="ctr"/>
+          <a:lstStyle/>
+          <a:p>
+            <a:r>
+              <a:rPr lang="en-US" sz="1200" dirty="0" smtClean="0">
+                <a:solidFill>
+                  <a:schemeClr val="tx1"/>
+                </a:solidFill>
+              </a:rPr>
+              <a:t>Search and replace</a:t>
             </a:r>
             <a:endParaRPr lang="en-US" sz="1200" dirty="0">
               <a:solidFill>
@@ -6944,7 +7076,6 @@
               <a:rPr lang="en-US" sz="1000" dirty="0" smtClean="0"/>
               <a:t>8x pads</a:t>
             </a:r>
-            <a:endParaRPr lang="en-US" sz="1000" dirty="0" smtClean="0"/>
           </a:p>
         </p:txBody>
       </p:sp>
@@ -6988,7 +7119,6 @@
               <a:rPr lang="en-US" sz="1000" dirty="0" smtClean="0"/>
               <a:t>4x channels</a:t>
             </a:r>
-            <a:endParaRPr lang="en-US" sz="1000" dirty="0" smtClean="0"/>
           </a:p>
         </p:txBody>
       </p:sp>
@@ -7032,7 +7162,6 @@
               <a:rPr lang="en-US" sz="1000" dirty="0" smtClean="0"/>
               <a:t>remove</a:t>
             </a:r>
-            <a:endParaRPr lang="en-US" sz="1000" dirty="0" smtClean="0"/>
           </a:p>
         </p:txBody>
       </p:sp>

</xml_diff>

<commit_message>
added verbose exceptions to debug crashes added crash clipbaord dialog box fixed small S4mk3 bug added DDJ-T1 support
</commit_message>
<xml_diff>
--- a/docs/pics/src/cmdr slides.pptx
+++ b/docs/pics/src/cmdr slides.pptx
@@ -12,6 +12,7 @@
     <p:sldId id="265" r:id="rId6"/>
     <p:sldId id="262" r:id="rId7"/>
     <p:sldId id="258" r:id="rId8"/>
+    <p:sldId id="266" r:id="rId9"/>
   </p:sldIdLst>
   <p:sldSz cx="9144000" cy="6858000" type="screen4x3"/>
   <p:notesSz cx="6858000" cy="9144000"/>
@@ -3984,11 +3985,6 @@
               </a:rPr>
               <a:t> no scrollbar!</a:t>
             </a:r>
-            <a:endParaRPr lang="en-US" sz="1200" dirty="0">
-              <a:solidFill>
-                <a:schemeClr val="tx1"/>
-              </a:solidFill>
-            </a:endParaRPr>
           </a:p>
         </p:txBody>
       </p:sp>
@@ -7288,6 +7284,274 @@
 </p:sld>
 </file>
 
+<file path=ppt/slides/slide8.xml><?xml version="1.0" encoding="utf-8"?>
+<p:sld xmlns:a="http://schemas.openxmlformats.org/drawingml/2006/main" xmlns:r="http://schemas.openxmlformats.org/officeDocument/2006/relationships" xmlns:p="http://schemas.openxmlformats.org/presentationml/2006/main">
+  <p:cSld>
+    <p:spTree>
+      <p:nvGrpSpPr>
+        <p:cNvPr id="1" name=""/>
+        <p:cNvGrpSpPr/>
+        <p:nvPr/>
+      </p:nvGrpSpPr>
+      <p:grpSpPr>
+        <a:xfrm>
+          <a:off x="0" y="0"/>
+          <a:ext cx="0" cy="0"/>
+          <a:chOff x="0" y="0"/>
+          <a:chExt cx="0" cy="0"/>
+        </a:xfrm>
+      </p:grpSpPr>
+      <p:pic>
+        <p:nvPicPr>
+          <p:cNvPr id="1026" name="Picture 2"/>
+          <p:cNvPicPr>
+            <a:picLocks noChangeAspect="1" noChangeArrowheads="1"/>
+          </p:cNvPicPr>
+          <p:nvPr/>
+        </p:nvPicPr>
+        <p:blipFill>
+          <a:blip r:embed="rId2">
+            <a:extLst>
+              <a:ext uri="{28A0092B-C50C-407E-A947-70E740481C1C}">
+                <a14:useLocalDpi xmlns:a14="http://schemas.microsoft.com/office/drawing/2010/main" val="0"/>
+              </a:ext>
+            </a:extLst>
+          </a:blip>
+          <a:srcRect/>
+          <a:stretch>
+            <a:fillRect/>
+          </a:stretch>
+        </p:blipFill>
+        <p:spPr bwMode="auto">
+          <a:xfrm>
+            <a:off x="381000" y="827231"/>
+            <a:ext cx="8361055" cy="4949681"/>
+          </a:xfrm>
+          <a:prstGeom prst="rect">
+            <a:avLst/>
+          </a:prstGeom>
+          <a:noFill/>
+          <a:ln>
+            <a:noFill/>
+          </a:ln>
+          <a:extLst>
+            <a:ext uri="{909E8E84-426E-40DD-AFC4-6F175D3DCCD1}">
+              <a14:hiddenFill xmlns:a14="http://schemas.microsoft.com/office/drawing/2010/main">
+                <a:solidFill>
+                  <a:schemeClr val="accent1"/>
+                </a:solidFill>
+              </a14:hiddenFill>
+            </a:ext>
+            <a:ext uri="{91240B29-F687-4F45-9708-019B960494DF}">
+              <a14:hiddenLine xmlns:a14="http://schemas.microsoft.com/office/drawing/2010/main" w="9525">
+                <a:solidFill>
+                  <a:schemeClr val="tx1"/>
+                </a:solidFill>
+                <a:miter lim="800000"/>
+                <a:headEnd/>
+                <a:tailEnd/>
+              </a14:hiddenLine>
+            </a:ext>
+          </a:extLst>
+        </p:spPr>
+      </p:pic>
+      <p:sp>
+        <p:nvSpPr>
+          <p:cNvPr id="4" name="Oval 3"/>
+          <p:cNvSpPr/>
+          <p:nvPr/>
+        </p:nvSpPr>
+        <p:spPr>
+          <a:xfrm>
+            <a:off x="533400" y="1752600"/>
+            <a:ext cx="990600" cy="381000"/>
+          </a:xfrm>
+          <a:prstGeom prst="ellipse">
+            <a:avLst/>
+          </a:prstGeom>
+          <a:noFill/>
+          <a:ln>
+            <a:solidFill>
+              <a:srgbClr val="C00000"/>
+            </a:solidFill>
+          </a:ln>
+        </p:spPr>
+        <p:style>
+          <a:lnRef idx="2">
+            <a:schemeClr val="accent1">
+              <a:shade val="50000"/>
+            </a:schemeClr>
+          </a:lnRef>
+          <a:fillRef idx="1">
+            <a:schemeClr val="accent1"/>
+          </a:fillRef>
+          <a:effectRef idx="0">
+            <a:schemeClr val="accent1"/>
+          </a:effectRef>
+          <a:fontRef idx="minor">
+            <a:schemeClr val="lt1"/>
+          </a:fontRef>
+        </p:style>
+        <p:txBody>
+          <a:bodyPr rtlCol="0" anchor="ctr"/>
+          <a:lstStyle/>
+          <a:p>
+            <a:pPr algn="ctr"/>
+            <a:endParaRPr lang="en-US"/>
+          </a:p>
+        </p:txBody>
+      </p:sp>
+      <p:sp>
+        <p:nvSpPr>
+          <p:cNvPr id="8" name="Oval 7"/>
+          <p:cNvSpPr/>
+          <p:nvPr/>
+        </p:nvSpPr>
+        <p:spPr>
+          <a:xfrm>
+            <a:off x="5715000" y="1777093"/>
+            <a:ext cx="990600" cy="432707"/>
+          </a:xfrm>
+          <a:prstGeom prst="ellipse">
+            <a:avLst/>
+          </a:prstGeom>
+          <a:noFill/>
+          <a:ln>
+            <a:solidFill>
+              <a:srgbClr val="C00000"/>
+            </a:solidFill>
+          </a:ln>
+        </p:spPr>
+        <p:style>
+          <a:lnRef idx="2">
+            <a:schemeClr val="accent1">
+              <a:shade val="50000"/>
+            </a:schemeClr>
+          </a:lnRef>
+          <a:fillRef idx="1">
+            <a:schemeClr val="accent1"/>
+          </a:fillRef>
+          <a:effectRef idx="0">
+            <a:schemeClr val="accent1"/>
+          </a:effectRef>
+          <a:fontRef idx="minor">
+            <a:schemeClr val="lt1"/>
+          </a:fontRef>
+        </p:style>
+        <p:txBody>
+          <a:bodyPr rtlCol="0" anchor="ctr"/>
+          <a:lstStyle/>
+          <a:p>
+            <a:pPr algn="ctr"/>
+            <a:endParaRPr lang="en-US"/>
+          </a:p>
+        </p:txBody>
+      </p:sp>
+      <p:sp>
+        <p:nvSpPr>
+          <p:cNvPr id="9" name="Oval 8"/>
+          <p:cNvSpPr/>
+          <p:nvPr/>
+        </p:nvSpPr>
+        <p:spPr>
+          <a:xfrm>
+            <a:off x="2694627" y="3962400"/>
+            <a:ext cx="3733800" cy="1600200"/>
+          </a:xfrm>
+          <a:prstGeom prst="ellipse">
+            <a:avLst/>
+          </a:prstGeom>
+          <a:noFill/>
+          <a:ln>
+            <a:solidFill>
+              <a:srgbClr val="C00000"/>
+            </a:solidFill>
+          </a:ln>
+        </p:spPr>
+        <p:style>
+          <a:lnRef idx="2">
+            <a:schemeClr val="accent1">
+              <a:shade val="50000"/>
+            </a:schemeClr>
+          </a:lnRef>
+          <a:fillRef idx="1">
+            <a:schemeClr val="accent1"/>
+          </a:fillRef>
+          <a:effectRef idx="0">
+            <a:schemeClr val="accent1"/>
+          </a:effectRef>
+          <a:fontRef idx="minor">
+            <a:schemeClr val="lt1"/>
+          </a:fontRef>
+        </p:style>
+        <p:txBody>
+          <a:bodyPr rtlCol="0" anchor="ctr"/>
+          <a:lstStyle/>
+          <a:p>
+            <a:pPr algn="ctr"/>
+            <a:endParaRPr lang="en-US"/>
+          </a:p>
+        </p:txBody>
+      </p:sp>
+      <p:sp>
+        <p:nvSpPr>
+          <p:cNvPr id="10" name="Oval 9"/>
+          <p:cNvSpPr/>
+          <p:nvPr/>
+        </p:nvSpPr>
+        <p:spPr>
+          <a:xfrm>
+            <a:off x="2670134" y="1752600"/>
+            <a:ext cx="990600" cy="381000"/>
+          </a:xfrm>
+          <a:prstGeom prst="ellipse">
+            <a:avLst/>
+          </a:prstGeom>
+          <a:noFill/>
+          <a:ln>
+            <a:solidFill>
+              <a:srgbClr val="C00000"/>
+            </a:solidFill>
+          </a:ln>
+        </p:spPr>
+        <p:style>
+          <a:lnRef idx="2">
+            <a:schemeClr val="accent1">
+              <a:shade val="50000"/>
+            </a:schemeClr>
+          </a:lnRef>
+          <a:fillRef idx="1">
+            <a:schemeClr val="accent1"/>
+          </a:fillRef>
+          <a:effectRef idx="0">
+            <a:schemeClr val="accent1"/>
+          </a:effectRef>
+          <a:fontRef idx="minor">
+            <a:schemeClr val="lt1"/>
+          </a:fontRef>
+        </p:style>
+        <p:txBody>
+          <a:bodyPr rtlCol="0" anchor="ctr"/>
+          <a:lstStyle/>
+          <a:p>
+            <a:pPr algn="ctr"/>
+            <a:endParaRPr lang="en-US"/>
+          </a:p>
+        </p:txBody>
+      </p:sp>
+    </p:spTree>
+    <p:extLst>
+      <p:ext uri="{BB962C8B-B14F-4D97-AF65-F5344CB8AC3E}">
+        <p14:creationId xmlns:p14="http://schemas.microsoft.com/office/powerpoint/2010/main" val="2253568184"/>
+      </p:ext>
+    </p:extLst>
+  </p:cSld>
+  <p:clrMapOvr>
+    <a:masterClrMapping/>
+  </p:clrMapOvr>
+</p:sld>
+</file>
+
 <file path=ppt/theme/theme1.xml><?xml version="1.0" encoding="utf-8"?>
 <a:theme xmlns:a="http://schemas.openxmlformats.org/drawingml/2006/main" name="Office Theme">
   <a:themeElements>

</xml_diff>